<commit_message>
ALB and ASG configured updated architecture image
</commit_message>
<xml_diff>
--- a/docs/images/Cribl_AWS.pptx
+++ b/docs/images/Cribl_AWS.pptx
@@ -5,30 +5,31 @@
     <p:sldMasterId id="2147483665" r:id="rId1"/>
   </p:sldMasterIdLst>
   <p:notesMasterIdLst>
-    <p:notesMasterId r:id="rId6"/>
+    <p:notesMasterId r:id="rId7"/>
   </p:notesMasterIdLst>
   <p:sldIdLst>
     <p:sldId id="256" r:id="rId2"/>
     <p:sldId id="275" r:id="rId3"/>
-    <p:sldId id="276" r:id="rId4"/>
-    <p:sldId id="274" r:id="rId5"/>
+    <p:sldId id="277" r:id="rId4"/>
+    <p:sldId id="276" r:id="rId5"/>
+    <p:sldId id="274" r:id="rId6"/>
   </p:sldIdLst>
   <p:sldSz cx="12192000" cy="6858000"/>
   <p:notesSz cx="6858000" cy="9144000"/>
   <p:embeddedFontLst>
     <p:embeddedFont>
       <p:font typeface="Calibri" panose="020F0502020204030204" pitchFamily="34" charset="0"/>
-      <p:regular r:id="rId7"/>
-      <p:bold r:id="rId8"/>
-      <p:italic r:id="rId9"/>
-      <p:boldItalic r:id="rId10"/>
+      <p:regular r:id="rId8"/>
+      <p:bold r:id="rId9"/>
+      <p:italic r:id="rId10"/>
+      <p:boldItalic r:id="rId11"/>
     </p:embeddedFont>
     <p:embeddedFont>
       <p:font typeface="Source Sans Pro" panose="020B0503030403020204" pitchFamily="34" charset="0"/>
-      <p:regular r:id="rId11"/>
-      <p:bold r:id="rId12"/>
-      <p:italic r:id="rId13"/>
-      <p:boldItalic r:id="rId14"/>
+      <p:regular r:id="rId12"/>
+      <p:bold r:id="rId13"/>
+      <p:italic r:id="rId14"/>
+      <p:boldItalic r:id="rId15"/>
     </p:embeddedFont>
   </p:embeddedFontLst>
   <p:defaultTextStyle>
@@ -1758,7 +1759,7 @@
             </a:pPr>
             <a:fld id="{00000000-1234-1234-1234-123412341234}" type="slidenum">
               <a:rPr lang="en-US"/>
-              <a:t>4</a:t>
+              <a:t>5</a:t>
             </a:fld>
             <a:endParaRPr/>
           </a:p>
@@ -9519,8 +9520,8 @@
         </p:nvSpPr>
         <p:spPr bwMode="auto">
           <a:xfrm>
-            <a:off x="2950126" y="2355574"/>
-            <a:ext cx="2095500" cy="1500810"/>
+            <a:off x="2950126" y="2912162"/>
+            <a:ext cx="2095500" cy="1381541"/>
           </a:xfrm>
           <a:prstGeom prst="rect">
             <a:avLst/>
@@ -9589,8 +9590,8 @@
         </p:nvSpPr>
         <p:spPr bwMode="auto">
           <a:xfrm>
-            <a:off x="7152238" y="2355574"/>
-            <a:ext cx="2095500" cy="1500810"/>
+            <a:off x="7152238" y="2912162"/>
+            <a:ext cx="2095500" cy="1381541"/>
           </a:xfrm>
           <a:prstGeom prst="rect">
             <a:avLst/>
@@ -9674,7 +9675,7 @@
         </p:blipFill>
         <p:spPr bwMode="auto">
           <a:xfrm>
-            <a:off x="3762926" y="2846432"/>
+            <a:off x="3762926" y="3403020"/>
             <a:ext cx="469900" cy="469900"/>
           </a:xfrm>
           <a:prstGeom prst="rect">
@@ -9721,7 +9722,7 @@
         </p:nvSpPr>
         <p:spPr bwMode="auto">
           <a:xfrm>
-            <a:off x="3113699" y="3291802"/>
+            <a:off x="3113699" y="3848390"/>
             <a:ext cx="1767152" cy="261610"/>
           </a:xfrm>
           <a:prstGeom prst="rect">
@@ -9897,7 +9898,7 @@
         </p:blipFill>
         <p:spPr bwMode="auto">
           <a:xfrm>
-            <a:off x="7965038" y="2846432"/>
+            <a:off x="7965038" y="3403020"/>
             <a:ext cx="469900" cy="469900"/>
           </a:xfrm>
           <a:prstGeom prst="rect">
@@ -9944,7 +9945,7 @@
         </p:nvSpPr>
         <p:spPr bwMode="auto">
           <a:xfrm>
-            <a:off x="7316029" y="3291802"/>
+            <a:off x="7316029" y="3848390"/>
             <a:ext cx="1767152" cy="261610"/>
           </a:xfrm>
           <a:prstGeom prst="rect">
@@ -10105,7 +10106,7 @@
         </p:nvSpPr>
         <p:spPr>
           <a:xfrm>
-            <a:off x="3035851" y="2700382"/>
+            <a:off x="3035851" y="3256970"/>
             <a:ext cx="6118225" cy="969963"/>
           </a:xfrm>
           <a:prstGeom prst="rect">
@@ -10296,7 +10297,7 @@
         </p:blipFill>
         <p:spPr>
           <a:xfrm>
-            <a:off x="5902876" y="2697320"/>
+            <a:off x="5902876" y="3253908"/>
             <a:ext cx="381000" cy="381000"/>
           </a:xfrm>
           <a:prstGeom prst="rect">
@@ -10333,7 +10334,7 @@
         </p:blipFill>
         <p:spPr bwMode="auto">
           <a:xfrm>
-            <a:off x="5854937" y="1705226"/>
+            <a:off x="5854937" y="2261814"/>
             <a:ext cx="469900" cy="469900"/>
           </a:xfrm>
           <a:prstGeom prst="rect">
@@ -10380,7 +10381,7 @@
         </p:nvSpPr>
         <p:spPr bwMode="auto">
           <a:xfrm>
-            <a:off x="5205710" y="2150596"/>
+            <a:off x="5205710" y="2707184"/>
             <a:ext cx="1767152" cy="276999"/>
           </a:xfrm>
           <a:prstGeom prst="rect">
@@ -11663,6 +11664,2885 @@
             </a:extLst>
           </p:cNvPr>
           <p:cNvCxnSpPr>
+            <a:cxnSpLocks/>
+            <a:stCxn id="34" idx="1"/>
+            <a:endCxn id="9" idx="1"/>
+          </p:cNvCxnSpPr>
+          <p:nvPr/>
+        </p:nvCxnSpPr>
+        <p:spPr>
+          <a:xfrm rot="10800000" flipH="1">
+            <a:off x="1270006" y="3602934"/>
+            <a:ext cx="1680120" cy="1433525"/>
+          </a:xfrm>
+          <a:prstGeom prst="bentConnector3">
+            <a:avLst>
+              <a:gd name="adj1" fmla="val -13606"/>
+            </a:avLst>
+          </a:prstGeom>
+          <a:ln>
+            <a:headEnd type="none"/>
+            <a:tailEnd type="arrow"/>
+          </a:ln>
+        </p:spPr>
+        <p:style>
+          <a:lnRef idx="1">
+            <a:schemeClr val="dk1"/>
+          </a:lnRef>
+          <a:fillRef idx="0">
+            <a:schemeClr val="dk1"/>
+          </a:fillRef>
+          <a:effectRef idx="0">
+            <a:schemeClr val="dk1"/>
+          </a:effectRef>
+          <a:fontRef idx="minor">
+            <a:schemeClr val="tx1"/>
+          </a:fontRef>
+        </p:style>
+      </p:cxnSp>
+      <p:cxnSp>
+        <p:nvCxnSpPr>
+          <p:cNvPr id="58" name="Elbow Connector 57">
+            <a:extLst>
+              <a:ext uri="{FF2B5EF4-FFF2-40B4-BE49-F238E27FC236}">
+                <a16:creationId xmlns:a16="http://schemas.microsoft.com/office/drawing/2014/main" id="{DEE4B40E-E19E-1140-A9C5-A47BB1369F55}"/>
+              </a:ext>
+            </a:extLst>
+          </p:cNvPr>
+          <p:cNvCxnSpPr>
+            <a:cxnSpLocks/>
+            <a:stCxn id="10" idx="3"/>
+            <a:endCxn id="43" idx="3"/>
+          </p:cNvCxnSpPr>
+          <p:nvPr/>
+        </p:nvCxnSpPr>
+        <p:spPr>
+          <a:xfrm>
+            <a:off x="9247738" y="3602933"/>
+            <a:ext cx="1714211" cy="1433525"/>
+          </a:xfrm>
+          <a:prstGeom prst="bentConnector3">
+            <a:avLst>
+              <a:gd name="adj1" fmla="val 113336"/>
+            </a:avLst>
+          </a:prstGeom>
+          <a:ln>
+            <a:tailEnd type="arrow"/>
+          </a:ln>
+        </p:spPr>
+        <p:style>
+          <a:lnRef idx="1">
+            <a:schemeClr val="dk1"/>
+          </a:lnRef>
+          <a:fillRef idx="0">
+            <a:schemeClr val="dk1"/>
+          </a:fillRef>
+          <a:effectRef idx="0">
+            <a:schemeClr val="dk1"/>
+          </a:effectRef>
+          <a:fontRef idx="minor">
+            <a:schemeClr val="tx1"/>
+          </a:fontRef>
+        </p:style>
+      </p:cxnSp>
+      <p:cxnSp>
+        <p:nvCxnSpPr>
+          <p:cNvPr id="60" name="Elbow Connector 59">
+            <a:extLst>
+              <a:ext uri="{FF2B5EF4-FFF2-40B4-BE49-F238E27FC236}">
+                <a16:creationId xmlns:a16="http://schemas.microsoft.com/office/drawing/2014/main" id="{CC541B64-5BAC-904F-87C7-1DEC968B6A60}"/>
+              </a:ext>
+            </a:extLst>
+          </p:cNvPr>
+          <p:cNvCxnSpPr>
+            <a:cxnSpLocks/>
+            <a:stCxn id="31" idx="1"/>
+            <a:endCxn id="9" idx="0"/>
+          </p:cNvCxnSpPr>
+          <p:nvPr/>
+        </p:nvCxnSpPr>
+        <p:spPr>
+          <a:xfrm rot="10800000" flipV="1">
+            <a:off x="3997877" y="2496764"/>
+            <a:ext cx="1857061" cy="415398"/>
+          </a:xfrm>
+          <a:prstGeom prst="bentConnector2">
+            <a:avLst/>
+          </a:prstGeom>
+          <a:ln>
+            <a:headEnd type="arrow"/>
+            <a:tailEnd type="arrow"/>
+          </a:ln>
+        </p:spPr>
+        <p:style>
+          <a:lnRef idx="1">
+            <a:schemeClr val="dk1"/>
+          </a:lnRef>
+          <a:fillRef idx="0">
+            <a:schemeClr val="dk1"/>
+          </a:fillRef>
+          <a:effectRef idx="0">
+            <a:schemeClr val="dk1"/>
+          </a:effectRef>
+          <a:fontRef idx="minor">
+            <a:schemeClr val="tx1"/>
+          </a:fontRef>
+        </p:style>
+      </p:cxnSp>
+      <p:cxnSp>
+        <p:nvCxnSpPr>
+          <p:cNvPr id="62" name="Elbow Connector 61">
+            <a:extLst>
+              <a:ext uri="{FF2B5EF4-FFF2-40B4-BE49-F238E27FC236}">
+                <a16:creationId xmlns:a16="http://schemas.microsoft.com/office/drawing/2014/main" id="{D381A7BD-33C7-C349-BC89-1045D2EC8E87}"/>
+              </a:ext>
+            </a:extLst>
+          </p:cNvPr>
+          <p:cNvCxnSpPr>
+            <a:cxnSpLocks/>
+            <a:stCxn id="31" idx="3"/>
+            <a:endCxn id="10" idx="0"/>
+          </p:cNvCxnSpPr>
+          <p:nvPr/>
+        </p:nvCxnSpPr>
+        <p:spPr>
+          <a:xfrm>
+            <a:off x="6324837" y="2496764"/>
+            <a:ext cx="1875151" cy="415398"/>
+          </a:xfrm>
+          <a:prstGeom prst="bentConnector2">
+            <a:avLst/>
+          </a:prstGeom>
+          <a:ln>
+            <a:headEnd type="arrow"/>
+            <a:tailEnd type="arrow"/>
+          </a:ln>
+        </p:spPr>
+        <p:style>
+          <a:lnRef idx="1">
+            <a:schemeClr val="dk1"/>
+          </a:lnRef>
+          <a:fillRef idx="0">
+            <a:schemeClr val="dk1"/>
+          </a:fillRef>
+          <a:effectRef idx="0">
+            <a:schemeClr val="dk1"/>
+          </a:effectRef>
+          <a:fontRef idx="minor">
+            <a:schemeClr val="tx1"/>
+          </a:fontRef>
+        </p:style>
+      </p:cxnSp>
+      <p:sp>
+        <p:nvSpPr>
+          <p:cNvPr id="53" name="Rectangle 52">
+            <a:extLst>
+              <a:ext uri="{FF2B5EF4-FFF2-40B4-BE49-F238E27FC236}">
+                <a16:creationId xmlns:a16="http://schemas.microsoft.com/office/drawing/2014/main" id="{2923F02B-F3F7-1F40-AEC0-917366509B03}"/>
+              </a:ext>
+            </a:extLst>
+          </p:cNvPr>
+          <p:cNvSpPr/>
+          <p:nvPr/>
+        </p:nvSpPr>
+        <p:spPr>
+          <a:xfrm>
+            <a:off x="5039764" y="2003374"/>
+            <a:ext cx="2095500" cy="969963"/>
+          </a:xfrm>
+          <a:prstGeom prst="rect">
+            <a:avLst/>
+          </a:prstGeom>
+          <a:noFill/>
+          <a:ln w="12700">
+            <a:solidFill>
+              <a:srgbClr val="D86613"/>
+            </a:solidFill>
+            <a:prstDash val="dash"/>
+          </a:ln>
+        </p:spPr>
+        <p:style>
+          <a:lnRef idx="2">
+            <a:schemeClr val="accent1">
+              <a:shade val="50000"/>
+            </a:schemeClr>
+          </a:lnRef>
+          <a:fillRef idx="1">
+            <a:schemeClr val="accent1"/>
+          </a:fillRef>
+          <a:effectRef idx="0">
+            <a:schemeClr val="accent1"/>
+          </a:effectRef>
+          <a:fontRef idx="minor">
+            <a:schemeClr val="lt1"/>
+          </a:fontRef>
+        </p:style>
+        <p:txBody>
+          <a:bodyPr tIns="91440"/>
+          <a:lstStyle/>
+          <a:p>
+            <a:pPr algn="ctr" eaLnBrk="1" fontAlgn="auto" hangingPunct="1">
+              <a:spcBef>
+                <a:spcPts val="0"/>
+              </a:spcBef>
+              <a:spcAft>
+                <a:spcPts val="0"/>
+              </a:spcAft>
+              <a:defRPr/>
+            </a:pPr>
+            <a:r>
+              <a:rPr lang="en-US" sz="1200" dirty="0">
+                <a:solidFill>
+                  <a:srgbClr val="D86613"/>
+                </a:solidFill>
+                <a:latin typeface="Arial" panose="020B0604020202020204" pitchFamily="34" charset="0"/>
+                <a:cs typeface="Arial" panose="020B0604020202020204" pitchFamily="34" charset="0"/>
+              </a:rPr>
+              <a:t>Leader Auto  Scaling group</a:t>
+            </a:r>
+          </a:p>
+        </p:txBody>
+      </p:sp>
+      <p:grpSp>
+        <p:nvGrpSpPr>
+          <p:cNvPr id="55" name="Group 54">
+            <a:extLst>
+              <a:ext uri="{FF2B5EF4-FFF2-40B4-BE49-F238E27FC236}">
+                <a16:creationId xmlns:a16="http://schemas.microsoft.com/office/drawing/2014/main" id="{B8991C53-623C-D047-83CA-88C552FAAE97}"/>
+              </a:ext>
+            </a:extLst>
+          </p:cNvPr>
+          <p:cNvGrpSpPr/>
+          <p:nvPr/>
+        </p:nvGrpSpPr>
+        <p:grpSpPr>
+          <a:xfrm>
+            <a:off x="3365840" y="1500811"/>
+            <a:ext cx="1339850" cy="905549"/>
+            <a:chOff x="6865178" y="2805113"/>
+            <a:chExt cx="1339850" cy="905549"/>
+          </a:xfrm>
+        </p:grpSpPr>
+        <p:sp>
+          <p:nvSpPr>
+            <p:cNvPr id="65" name="TextBox 19">
+              <a:extLst>
+                <a:ext uri="{FF2B5EF4-FFF2-40B4-BE49-F238E27FC236}">
+                  <a16:creationId xmlns:a16="http://schemas.microsoft.com/office/drawing/2014/main" id="{225210F9-D466-254B-BE05-FACD1FBCAD4D}"/>
+                </a:ext>
+              </a:extLst>
+            </p:cNvPr>
+            <p:cNvSpPr txBox="1">
+              <a:spLocks noChangeArrowheads="1"/>
+            </p:cNvSpPr>
+            <p:nvPr/>
+          </p:nvSpPr>
+          <p:spPr bwMode="auto">
+            <a:xfrm>
+              <a:off x="6865178" y="3279775"/>
+              <a:ext cx="1339850" cy="430887"/>
+            </a:xfrm>
+            <a:prstGeom prst="rect">
+              <a:avLst/>
+            </a:prstGeom>
+            <a:noFill/>
+            <a:ln>
+              <a:noFill/>
+            </a:ln>
+            <a:extLst>
+              <a:ext uri="{909E8E84-426E-40DD-AFC4-6F175D3DCCD1}">
+                <a14:hiddenFill xmlns:a14="http://schemas.microsoft.com/office/drawing/2010/main">
+                  <a:solidFill>
+                    <a:srgbClr val="FFFFFF"/>
+                  </a:solidFill>
+                </a14:hiddenFill>
+              </a:ext>
+              <a:ext uri="{91240B29-F687-4F45-9708-019B960494DF}">
+                <a14:hiddenLine xmlns:a14="http://schemas.microsoft.com/office/drawing/2010/main" w="9525">
+                  <a:solidFill>
+                    <a:srgbClr val="000000"/>
+                  </a:solidFill>
+                  <a:miter lim="800000"/>
+                  <a:headEnd/>
+                  <a:tailEnd/>
+                </a14:hiddenLine>
+              </a:ext>
+            </a:extLst>
+          </p:spPr>
+          <p:txBody>
+            <a:bodyPr wrap="square">
+              <a:spAutoFit/>
+            </a:bodyPr>
+            <a:lstStyle>
+              <a:lvl1pPr>
+                <a:defRPr>
+                  <a:solidFill>
+                    <a:schemeClr val="tx1"/>
+                  </a:solidFill>
+                  <a:latin typeface="Calibri" panose="020F0502020204030204" pitchFamily="34" charset="0"/>
+                </a:defRPr>
+              </a:lvl1pPr>
+              <a:lvl2pPr marL="742950" indent="-285750">
+                <a:defRPr>
+                  <a:solidFill>
+                    <a:schemeClr val="tx1"/>
+                  </a:solidFill>
+                  <a:latin typeface="Calibri" panose="020F0502020204030204" pitchFamily="34" charset="0"/>
+                </a:defRPr>
+              </a:lvl2pPr>
+              <a:lvl3pPr marL="1143000" indent="-228600">
+                <a:defRPr>
+                  <a:solidFill>
+                    <a:schemeClr val="tx1"/>
+                  </a:solidFill>
+                  <a:latin typeface="Calibri" panose="020F0502020204030204" pitchFamily="34" charset="0"/>
+                </a:defRPr>
+              </a:lvl3pPr>
+              <a:lvl4pPr marL="1600200" indent="-228600">
+                <a:defRPr>
+                  <a:solidFill>
+                    <a:schemeClr val="tx1"/>
+                  </a:solidFill>
+                  <a:latin typeface="Calibri" panose="020F0502020204030204" pitchFamily="34" charset="0"/>
+                </a:defRPr>
+              </a:lvl4pPr>
+              <a:lvl5pPr marL="2057400" indent="-228600">
+                <a:defRPr>
+                  <a:solidFill>
+                    <a:schemeClr val="tx1"/>
+                  </a:solidFill>
+                  <a:latin typeface="Calibri" panose="020F0502020204030204" pitchFamily="34" charset="0"/>
+                </a:defRPr>
+              </a:lvl5pPr>
+              <a:lvl6pPr marL="2514600" indent="-228600" eaLnBrk="0" fontAlgn="base" hangingPunct="0">
+                <a:spcBef>
+                  <a:spcPct val="0"/>
+                </a:spcBef>
+                <a:spcAft>
+                  <a:spcPct val="0"/>
+                </a:spcAft>
+                <a:defRPr>
+                  <a:solidFill>
+                    <a:schemeClr val="tx1"/>
+                  </a:solidFill>
+                  <a:latin typeface="Calibri" panose="020F0502020204030204" pitchFamily="34" charset="0"/>
+                </a:defRPr>
+              </a:lvl6pPr>
+              <a:lvl7pPr marL="2971800" indent="-228600" eaLnBrk="0" fontAlgn="base" hangingPunct="0">
+                <a:spcBef>
+                  <a:spcPct val="0"/>
+                </a:spcBef>
+                <a:spcAft>
+                  <a:spcPct val="0"/>
+                </a:spcAft>
+                <a:defRPr>
+                  <a:solidFill>
+                    <a:schemeClr val="tx1"/>
+                  </a:solidFill>
+                  <a:latin typeface="Calibri" panose="020F0502020204030204" pitchFamily="34" charset="0"/>
+                </a:defRPr>
+              </a:lvl7pPr>
+              <a:lvl8pPr marL="3429000" indent="-228600" eaLnBrk="0" fontAlgn="base" hangingPunct="0">
+                <a:spcBef>
+                  <a:spcPct val="0"/>
+                </a:spcBef>
+                <a:spcAft>
+                  <a:spcPct val="0"/>
+                </a:spcAft>
+                <a:defRPr>
+                  <a:solidFill>
+                    <a:schemeClr val="tx1"/>
+                  </a:solidFill>
+                  <a:latin typeface="Calibri" panose="020F0502020204030204" pitchFamily="34" charset="0"/>
+                </a:defRPr>
+              </a:lvl8pPr>
+              <a:lvl9pPr marL="3886200" indent="-228600" eaLnBrk="0" fontAlgn="base" hangingPunct="0">
+                <a:spcBef>
+                  <a:spcPct val="0"/>
+                </a:spcBef>
+                <a:spcAft>
+                  <a:spcPct val="0"/>
+                </a:spcAft>
+                <a:defRPr>
+                  <a:solidFill>
+                    <a:schemeClr val="tx1"/>
+                  </a:solidFill>
+                  <a:latin typeface="Calibri" panose="020F0502020204030204" pitchFamily="34" charset="0"/>
+                </a:defRPr>
+              </a:lvl9pPr>
+            </a:lstStyle>
+            <a:p>
+              <a:pPr algn="ctr" eaLnBrk="1" hangingPunct="1"/>
+              <a:r>
+                <a:rPr lang="en-US" altLang="en-US" sz="1100" dirty="0">
+                  <a:latin typeface="Arial" panose="020B0604020202020204" pitchFamily="34" charset="0"/>
+                  <a:ea typeface="Amazon Ember" panose="020B0603020204020204" pitchFamily="34" charset="0"/>
+                  <a:cs typeface="Arial" panose="020B0604020202020204" pitchFamily="34" charset="0"/>
+                </a:rPr>
+                <a:t>Application Load </a:t>
+              </a:r>
+              <a:br>
+                <a:rPr lang="en-US" altLang="en-US" sz="1100" dirty="0">
+                  <a:latin typeface="Arial" panose="020B0604020202020204" pitchFamily="34" charset="0"/>
+                  <a:ea typeface="Amazon Ember" panose="020B0603020204020204" pitchFamily="34" charset="0"/>
+                  <a:cs typeface="Arial" panose="020B0604020202020204" pitchFamily="34" charset="0"/>
+                </a:rPr>
+              </a:br>
+              <a:r>
+                <a:rPr lang="en-US" altLang="en-US" sz="1100" dirty="0">
+                  <a:latin typeface="Arial" panose="020B0604020202020204" pitchFamily="34" charset="0"/>
+                  <a:ea typeface="Amazon Ember" panose="020B0603020204020204" pitchFamily="34" charset="0"/>
+                  <a:cs typeface="Arial" panose="020B0604020202020204" pitchFamily="34" charset="0"/>
+                </a:rPr>
+                <a:t>Balancer</a:t>
+              </a:r>
+            </a:p>
+          </p:txBody>
+        </p:sp>
+        <p:pic>
+          <p:nvPicPr>
+            <p:cNvPr id="66" name="Graphic 8">
+              <a:extLst>
+                <a:ext uri="{FF2B5EF4-FFF2-40B4-BE49-F238E27FC236}">
+                  <a16:creationId xmlns:a16="http://schemas.microsoft.com/office/drawing/2014/main" id="{F5BBF940-5BD6-1D40-8338-2EA314C6198C}"/>
+                </a:ext>
+              </a:extLst>
+            </p:cNvPr>
+            <p:cNvPicPr>
+              <a:picLocks noChangeAspect="1" noChangeArrowheads="1"/>
+            </p:cNvPicPr>
+            <p:nvPr/>
+          </p:nvPicPr>
+          <p:blipFill>
+            <a:blip r:embed="rId14">
+              <a:extLst>
+                <a:ext uri="{28A0092B-C50C-407E-A947-70E740481C1C}">
+                  <a14:useLocalDpi xmlns:a14="http://schemas.microsoft.com/office/drawing/2010/main" val="0"/>
+                </a:ext>
+              </a:extLst>
+            </a:blip>
+            <a:srcRect/>
+            <a:stretch>
+              <a:fillRect/>
+            </a:stretch>
+          </p:blipFill>
+          <p:spPr bwMode="auto">
+            <a:xfrm>
+              <a:off x="7302500" y="2805113"/>
+              <a:ext cx="457200" cy="457200"/>
+            </a:xfrm>
+            <a:prstGeom prst="rect">
+              <a:avLst/>
+            </a:prstGeom>
+            <a:noFill/>
+            <a:ln>
+              <a:noFill/>
+            </a:ln>
+            <a:extLst>
+              <a:ext uri="{909E8E84-426E-40DD-AFC4-6F175D3DCCD1}">
+                <a14:hiddenFill xmlns:a14="http://schemas.microsoft.com/office/drawing/2010/main">
+                  <a:solidFill>
+                    <a:srgbClr val="FFFFFF"/>
+                  </a:solidFill>
+                </a14:hiddenFill>
+              </a:ext>
+              <a:ext uri="{91240B29-F687-4F45-9708-019B960494DF}">
+                <a14:hiddenLine xmlns:a14="http://schemas.microsoft.com/office/drawing/2010/main" w="9525">
+                  <a:solidFill>
+                    <a:srgbClr val="000000"/>
+                  </a:solidFill>
+                  <a:miter lim="800000"/>
+                  <a:headEnd/>
+                  <a:tailEnd/>
+                </a14:hiddenLine>
+              </a:ext>
+            </a:extLst>
+          </p:spPr>
+        </p:pic>
+      </p:grpSp>
+      <p:pic>
+        <p:nvPicPr>
+          <p:cNvPr id="57" name="Graphic 6">
+            <a:extLst>
+              <a:ext uri="{FF2B5EF4-FFF2-40B4-BE49-F238E27FC236}">
+                <a16:creationId xmlns:a16="http://schemas.microsoft.com/office/drawing/2014/main" id="{FD09D296-81B4-C24A-B398-48B008314FA5}"/>
+              </a:ext>
+            </a:extLst>
+          </p:cNvPr>
+          <p:cNvPicPr>
+            <a:picLocks noChangeAspect="1" noChangeArrowheads="1"/>
+          </p:cNvPicPr>
+          <p:nvPr/>
+        </p:nvPicPr>
+        <p:blipFill>
+          <a:blip r:embed="rId15">
+            <a:extLst>
+              <a:ext uri="{96DAC541-7B7A-43D3-8B79-37D633B846F1}">
+                <asvg:svgBlip xmlns:asvg="http://schemas.microsoft.com/office/drawing/2016/SVG/main" r:embed="rId16"/>
+              </a:ext>
+            </a:extLst>
+          </a:blip>
+          <a:srcRect/>
+          <a:stretch/>
+        </p:blipFill>
+        <p:spPr bwMode="auto">
+          <a:xfrm flipH="1">
+            <a:off x="2009348" y="1516563"/>
+            <a:ext cx="469900" cy="469900"/>
+          </a:xfrm>
+          <a:prstGeom prst="rect">
+            <a:avLst/>
+          </a:prstGeom>
+          <a:noFill/>
+          <a:ln>
+            <a:noFill/>
+          </a:ln>
+          <a:extLst>
+            <a:ext uri="{909E8E84-426E-40DD-AFC4-6F175D3DCCD1}">
+              <a14:hiddenFill xmlns:a14="http://schemas.microsoft.com/office/drawing/2010/main">
+                <a:solidFill>
+                  <a:srgbClr val="FFFFFF"/>
+                </a:solidFill>
+              </a14:hiddenFill>
+            </a:ext>
+            <a:ext uri="{91240B29-F687-4F45-9708-019B960494DF}">
+              <a14:hiddenLine xmlns:a14="http://schemas.microsoft.com/office/drawing/2010/main" w="9525">
+                <a:solidFill>
+                  <a:srgbClr val="000000"/>
+                </a:solidFill>
+                <a:miter lim="800000"/>
+                <a:headEnd/>
+                <a:tailEnd/>
+              </a14:hiddenLine>
+            </a:ext>
+          </a:extLst>
+        </p:spPr>
+      </p:pic>
+      <p:cxnSp>
+        <p:nvCxnSpPr>
+          <p:cNvPr id="59" name="Straight Arrow Connector 58">
+            <a:extLst>
+              <a:ext uri="{FF2B5EF4-FFF2-40B4-BE49-F238E27FC236}">
+                <a16:creationId xmlns:a16="http://schemas.microsoft.com/office/drawing/2014/main" id="{1AD47A3B-DEEF-8947-91F7-2CCCA43F921A}"/>
+              </a:ext>
+            </a:extLst>
+          </p:cNvPr>
+          <p:cNvCxnSpPr>
+            <a:cxnSpLocks/>
+          </p:cNvCxnSpPr>
+          <p:nvPr/>
+        </p:nvCxnSpPr>
+        <p:spPr>
+          <a:xfrm>
+            <a:off x="2613392" y="1815013"/>
+            <a:ext cx="1046162" cy="0"/>
+          </a:xfrm>
+          <a:prstGeom prst="straightConnector1">
+            <a:avLst/>
+          </a:prstGeom>
+          <a:ln w="12700">
+            <a:solidFill>
+              <a:schemeClr val="tx2"/>
+            </a:solidFill>
+            <a:headEnd type="none" w="med" len="sm"/>
+            <a:tailEnd type="arrow" w="med" len="sm"/>
+          </a:ln>
+        </p:spPr>
+        <p:style>
+          <a:lnRef idx="1">
+            <a:schemeClr val="accent1"/>
+          </a:lnRef>
+          <a:fillRef idx="0">
+            <a:schemeClr val="accent1"/>
+          </a:fillRef>
+          <a:effectRef idx="0">
+            <a:schemeClr val="accent1"/>
+          </a:effectRef>
+          <a:fontRef idx="minor">
+            <a:schemeClr val="tx1"/>
+          </a:fontRef>
+        </p:style>
+      </p:cxnSp>
+      <p:sp>
+        <p:nvSpPr>
+          <p:cNvPr id="64" name="TextBox 63">
+            <a:extLst>
+              <a:ext uri="{FF2B5EF4-FFF2-40B4-BE49-F238E27FC236}">
+                <a16:creationId xmlns:a16="http://schemas.microsoft.com/office/drawing/2014/main" id="{61B9C1F2-BE05-C749-B527-03F300E41019}"/>
+              </a:ext>
+            </a:extLst>
+          </p:cNvPr>
+          <p:cNvSpPr txBox="1"/>
+          <p:nvPr/>
+        </p:nvSpPr>
+        <p:spPr>
+          <a:xfrm>
+            <a:off x="1764323" y="1942991"/>
+            <a:ext cx="978153" cy="461665"/>
+          </a:xfrm>
+          <a:prstGeom prst="rect">
+            <a:avLst/>
+          </a:prstGeom>
+          <a:noFill/>
+        </p:spPr>
+        <p:txBody>
+          <a:bodyPr wrap="none" rtlCol="0">
+            <a:spAutoFit/>
+          </a:bodyPr>
+          <a:lstStyle/>
+          <a:p>
+            <a:pPr algn="ctr"/>
+            <a:r>
+              <a:rPr lang="en-US" sz="1200" dirty="0"/>
+              <a:t>LogStream </a:t>
+            </a:r>
+          </a:p>
+          <a:p>
+            <a:pPr algn="ctr"/>
+            <a:r>
+              <a:rPr lang="en-US" sz="1200" dirty="0"/>
+              <a:t>Users</a:t>
+            </a:r>
+          </a:p>
+        </p:txBody>
+      </p:sp>
+      <p:cxnSp>
+        <p:nvCxnSpPr>
+          <p:cNvPr id="12" name="Elbow Connector 11">
+            <a:extLst>
+              <a:ext uri="{FF2B5EF4-FFF2-40B4-BE49-F238E27FC236}">
+                <a16:creationId xmlns:a16="http://schemas.microsoft.com/office/drawing/2014/main" id="{EE4051A7-3317-5B45-8007-ED1EFE80709E}"/>
+              </a:ext>
+            </a:extLst>
+          </p:cNvPr>
+          <p:cNvCxnSpPr>
+            <a:stCxn id="66" idx="3"/>
+            <a:endCxn id="53" idx="0"/>
+          </p:cNvCxnSpPr>
+          <p:nvPr/>
+        </p:nvCxnSpPr>
+        <p:spPr>
+          <a:xfrm>
+            <a:off x="4260362" y="1729411"/>
+            <a:ext cx="1827152" cy="273963"/>
+          </a:xfrm>
+          <a:prstGeom prst="bentConnector2">
+            <a:avLst/>
+          </a:prstGeom>
+          <a:ln>
+            <a:solidFill>
+              <a:schemeClr val="tx1"/>
+            </a:solidFill>
+            <a:tailEnd type="arrow"/>
+          </a:ln>
+        </p:spPr>
+        <p:style>
+          <a:lnRef idx="1">
+            <a:schemeClr val="accent1"/>
+          </a:lnRef>
+          <a:fillRef idx="0">
+            <a:schemeClr val="accent1"/>
+          </a:fillRef>
+          <a:effectRef idx="0">
+            <a:schemeClr val="accent1"/>
+          </a:effectRef>
+          <a:fontRef idx="minor">
+            <a:schemeClr val="tx1"/>
+          </a:fontRef>
+        </p:style>
+      </p:cxnSp>
+    </p:spTree>
+    <p:extLst>
+      <p:ext uri="{BB962C8B-B14F-4D97-AF65-F5344CB8AC3E}">
+        <p14:creationId xmlns:p14="http://schemas.microsoft.com/office/powerpoint/2010/main" val="512673369"/>
+      </p:ext>
+    </p:extLst>
+  </p:cSld>
+  <p:clrMapOvr>
+    <a:masterClrMapping/>
+  </p:clrMapOvr>
+</p:sld>
+</file>
+
+<file path=ppt/slides/slide3.xml><?xml version="1.0" encoding="utf-8"?>
+<p:sld xmlns:a="http://schemas.openxmlformats.org/drawingml/2006/main" xmlns:r="http://schemas.openxmlformats.org/officeDocument/2006/relationships" xmlns:p="http://schemas.openxmlformats.org/presentationml/2006/main">
+  <p:cSld>
+    <p:spTree>
+      <p:nvGrpSpPr>
+        <p:cNvPr id="1" name=""/>
+        <p:cNvGrpSpPr/>
+        <p:nvPr/>
+      </p:nvGrpSpPr>
+      <p:grpSpPr>
+        <a:xfrm>
+          <a:off x="0" y="0"/>
+          <a:ext cx="0" cy="0"/>
+          <a:chOff x="0" y="0"/>
+          <a:chExt cx="0" cy="0"/>
+        </a:xfrm>
+      </p:grpSpPr>
+      <p:sp>
+        <p:nvSpPr>
+          <p:cNvPr id="2" name="Title 1">
+            <a:extLst>
+              <a:ext uri="{FF2B5EF4-FFF2-40B4-BE49-F238E27FC236}">
+                <a16:creationId xmlns:a16="http://schemas.microsoft.com/office/drawing/2014/main" id="{70E1DAAE-910D-AD46-84A2-CD668D0DBC19}"/>
+              </a:ext>
+            </a:extLst>
+          </p:cNvPr>
+          <p:cNvSpPr>
+            <a:spLocks noGrp="1"/>
+          </p:cNvSpPr>
+          <p:nvPr>
+            <p:ph type="title"/>
+          </p:nvPr>
+        </p:nvSpPr>
+        <p:spPr/>
+        <p:txBody>
+          <a:bodyPr/>
+          <a:lstStyle/>
+          <a:p>
+            <a:r>
+              <a:rPr lang="en-US" dirty="0"/>
+              <a:t>Cribl LogStream Workers (Cribl Cloud)</a:t>
+            </a:r>
+          </a:p>
+        </p:txBody>
+      </p:sp>
+      <p:sp>
+        <p:nvSpPr>
+          <p:cNvPr id="7" name="Rectangle 6">
+            <a:extLst>
+              <a:ext uri="{FF2B5EF4-FFF2-40B4-BE49-F238E27FC236}">
+                <a16:creationId xmlns:a16="http://schemas.microsoft.com/office/drawing/2014/main" id="{14E1F782-3753-C94A-BC41-58F4543E5CFA}"/>
+              </a:ext>
+            </a:extLst>
+          </p:cNvPr>
+          <p:cNvSpPr/>
+          <p:nvPr/>
+        </p:nvSpPr>
+        <p:spPr bwMode="auto">
+          <a:xfrm>
+            <a:off x="909431" y="2355574"/>
+            <a:ext cx="10371550" cy="3453046"/>
+          </a:xfrm>
+          <a:prstGeom prst="rect">
+            <a:avLst/>
+          </a:prstGeom>
+          <a:noFill/>
+          <a:ln w="12700">
+            <a:solidFill>
+              <a:srgbClr val="1E8900"/>
+            </a:solidFill>
+          </a:ln>
+        </p:spPr>
+        <p:style>
+          <a:lnRef idx="2">
+            <a:schemeClr val="accent1">
+              <a:shade val="50000"/>
+            </a:schemeClr>
+          </a:lnRef>
+          <a:fillRef idx="1">
+            <a:schemeClr val="accent1"/>
+          </a:fillRef>
+          <a:effectRef idx="0">
+            <a:schemeClr val="accent1"/>
+          </a:effectRef>
+          <a:fontRef idx="minor">
+            <a:schemeClr val="lt1"/>
+          </a:fontRef>
+        </p:style>
+        <p:txBody>
+          <a:bodyPr lIns="502920" tIns="91440"/>
+          <a:lstStyle/>
+          <a:p>
+            <a:pPr eaLnBrk="1" fontAlgn="auto" hangingPunct="1">
+              <a:spcBef>
+                <a:spcPts val="0"/>
+              </a:spcBef>
+              <a:spcAft>
+                <a:spcPts val="0"/>
+              </a:spcAft>
+              <a:defRPr/>
+            </a:pPr>
+            <a:r>
+              <a:rPr lang="en-US" sz="1200" dirty="0">
+                <a:ln w="0"/>
+                <a:solidFill>
+                  <a:srgbClr val="1E8900"/>
+                </a:solidFill>
+                <a:latin typeface="Arial" panose="020B0604020202020204" pitchFamily="34" charset="0"/>
+                <a:cs typeface="Arial" panose="020B0604020202020204" pitchFamily="34" charset="0"/>
+              </a:rPr>
+              <a:t>VPC</a:t>
+            </a:r>
+          </a:p>
+        </p:txBody>
+      </p:sp>
+      <p:sp>
+        <p:nvSpPr>
+          <p:cNvPr id="8" name="Rectangle 7">
+            <a:extLst>
+              <a:ext uri="{FF2B5EF4-FFF2-40B4-BE49-F238E27FC236}">
+                <a16:creationId xmlns:a16="http://schemas.microsoft.com/office/drawing/2014/main" id="{3CAB4C6C-D2C7-7849-8A20-5D3F6918DD4B}"/>
+              </a:ext>
+            </a:extLst>
+          </p:cNvPr>
+          <p:cNvSpPr/>
+          <p:nvPr/>
+        </p:nvSpPr>
+        <p:spPr bwMode="auto">
+          <a:xfrm>
+            <a:off x="528431" y="1049380"/>
+            <a:ext cx="11135138" cy="5172515"/>
+          </a:xfrm>
+          <a:prstGeom prst="rect">
+            <a:avLst/>
+          </a:prstGeom>
+          <a:noFill/>
+          <a:ln w="12700">
+            <a:solidFill>
+              <a:schemeClr val="tx1"/>
+            </a:solidFill>
+          </a:ln>
+        </p:spPr>
+        <p:style>
+          <a:lnRef idx="2">
+            <a:schemeClr val="accent1">
+              <a:shade val="50000"/>
+            </a:schemeClr>
+          </a:lnRef>
+          <a:fillRef idx="1">
+            <a:schemeClr val="accent1"/>
+          </a:fillRef>
+          <a:effectRef idx="0">
+            <a:schemeClr val="accent1"/>
+          </a:effectRef>
+          <a:fontRef idx="minor">
+            <a:schemeClr val="lt1"/>
+          </a:fontRef>
+        </p:style>
+        <p:txBody>
+          <a:bodyPr lIns="502920" tIns="91440"/>
+          <a:lstStyle/>
+          <a:p>
+            <a:pPr eaLnBrk="1" fontAlgn="auto" hangingPunct="1">
+              <a:spcBef>
+                <a:spcPts val="0"/>
+              </a:spcBef>
+              <a:spcAft>
+                <a:spcPts val="0"/>
+              </a:spcAft>
+              <a:defRPr/>
+            </a:pPr>
+            <a:r>
+              <a:rPr lang="en-US" sz="1200" dirty="0">
+                <a:solidFill>
+                  <a:sysClr val="windowText" lastClr="000000"/>
+                </a:solidFill>
+                <a:latin typeface="Arial" panose="020B0604020202020204" pitchFamily="34" charset="0"/>
+                <a:cs typeface="Arial" panose="020B0604020202020204" pitchFamily="34" charset="0"/>
+              </a:rPr>
+              <a:t>AWS Cloud</a:t>
+            </a:r>
+          </a:p>
+        </p:txBody>
+      </p:sp>
+      <p:sp>
+        <p:nvSpPr>
+          <p:cNvPr id="9" name="Rectangle 8">
+            <a:extLst>
+              <a:ext uri="{FF2B5EF4-FFF2-40B4-BE49-F238E27FC236}">
+                <a16:creationId xmlns:a16="http://schemas.microsoft.com/office/drawing/2014/main" id="{A88BD5B1-1FCC-2443-9823-D0A2DACDBBB0}"/>
+              </a:ext>
+            </a:extLst>
+          </p:cNvPr>
+          <p:cNvSpPr/>
+          <p:nvPr/>
+        </p:nvSpPr>
+        <p:spPr bwMode="auto">
+          <a:xfrm>
+            <a:off x="2950126" y="2355574"/>
+            <a:ext cx="2095500" cy="1500810"/>
+          </a:xfrm>
+          <a:prstGeom prst="rect">
+            <a:avLst/>
+          </a:prstGeom>
+          <a:noFill/>
+          <a:ln w="12700">
+            <a:solidFill>
+              <a:srgbClr val="5B9CD5"/>
+            </a:solidFill>
+            <a:prstDash val="dash"/>
+          </a:ln>
+        </p:spPr>
+        <p:style>
+          <a:lnRef idx="2">
+            <a:schemeClr val="accent1">
+              <a:shade val="50000"/>
+            </a:schemeClr>
+          </a:lnRef>
+          <a:fillRef idx="1">
+            <a:schemeClr val="accent1"/>
+          </a:fillRef>
+          <a:effectRef idx="0">
+            <a:schemeClr val="accent1"/>
+          </a:effectRef>
+          <a:fontRef idx="minor">
+            <a:schemeClr val="lt1"/>
+          </a:fontRef>
+        </p:style>
+        <p:txBody>
+          <a:bodyPr tIns="91440"/>
+          <a:lstStyle/>
+          <a:p>
+            <a:pPr algn="ctr" eaLnBrk="1" fontAlgn="auto" hangingPunct="1">
+              <a:spcBef>
+                <a:spcPts val="0"/>
+              </a:spcBef>
+              <a:spcAft>
+                <a:spcPts val="0"/>
+              </a:spcAft>
+              <a:defRPr/>
+            </a:pPr>
+            <a:r>
+              <a:rPr lang="en-US" sz="1200" dirty="0">
+                <a:solidFill>
+                  <a:srgbClr val="5B9CD5"/>
+                </a:solidFill>
+                <a:latin typeface="Arial" panose="020B0604020202020204" pitchFamily="34" charset="0"/>
+                <a:cs typeface="Arial" panose="020B0604020202020204" pitchFamily="34" charset="0"/>
+              </a:rPr>
+              <a:t>Availability Zone 1</a:t>
+            </a:r>
+          </a:p>
+        </p:txBody>
+      </p:sp>
+      <p:sp>
+        <p:nvSpPr>
+          <p:cNvPr id="10" name="Rectangle 9">
+            <a:extLst>
+              <a:ext uri="{FF2B5EF4-FFF2-40B4-BE49-F238E27FC236}">
+                <a16:creationId xmlns:a16="http://schemas.microsoft.com/office/drawing/2014/main" id="{E72CAD76-5FF1-DF46-BA67-0A768FD8A881}"/>
+              </a:ext>
+            </a:extLst>
+          </p:cNvPr>
+          <p:cNvSpPr/>
+          <p:nvPr/>
+        </p:nvSpPr>
+        <p:spPr bwMode="auto">
+          <a:xfrm>
+            <a:off x="7152238" y="2355574"/>
+            <a:ext cx="2095500" cy="1500810"/>
+          </a:xfrm>
+          <a:prstGeom prst="rect">
+            <a:avLst/>
+          </a:prstGeom>
+          <a:noFill/>
+          <a:ln w="12700">
+            <a:solidFill>
+              <a:srgbClr val="5B9CD5"/>
+            </a:solidFill>
+            <a:prstDash val="dash"/>
+          </a:ln>
+        </p:spPr>
+        <p:style>
+          <a:lnRef idx="2">
+            <a:schemeClr val="accent1">
+              <a:shade val="50000"/>
+            </a:schemeClr>
+          </a:lnRef>
+          <a:fillRef idx="1">
+            <a:schemeClr val="accent1"/>
+          </a:fillRef>
+          <a:effectRef idx="0">
+            <a:schemeClr val="accent1"/>
+          </a:effectRef>
+          <a:fontRef idx="minor">
+            <a:schemeClr val="lt1"/>
+          </a:fontRef>
+        </p:style>
+        <p:txBody>
+          <a:bodyPr tIns="91440"/>
+          <a:lstStyle/>
+          <a:p>
+            <a:pPr algn="ctr" eaLnBrk="1" fontAlgn="auto" hangingPunct="1">
+              <a:spcBef>
+                <a:spcPts val="0"/>
+              </a:spcBef>
+              <a:spcAft>
+                <a:spcPts val="0"/>
+              </a:spcAft>
+              <a:defRPr/>
+            </a:pPr>
+            <a:r>
+              <a:rPr lang="en-US" sz="1200" dirty="0">
+                <a:solidFill>
+                  <a:srgbClr val="5B9CD5"/>
+                </a:solidFill>
+                <a:latin typeface="Arial" panose="020B0604020202020204" pitchFamily="34" charset="0"/>
+                <a:cs typeface="Arial" panose="020B0604020202020204" pitchFamily="34" charset="0"/>
+              </a:rPr>
+              <a:t>Availability Zone 2</a:t>
+            </a:r>
+          </a:p>
+        </p:txBody>
+      </p:sp>
+      <p:pic>
+        <p:nvPicPr>
+          <p:cNvPr id="15" name="Graphic 17">
+            <a:extLst>
+              <a:ext uri="{FF2B5EF4-FFF2-40B4-BE49-F238E27FC236}">
+                <a16:creationId xmlns:a16="http://schemas.microsoft.com/office/drawing/2014/main" id="{9A7E4015-4497-584F-9D9C-26993736A43D}"/>
+              </a:ext>
+            </a:extLst>
+          </p:cNvPr>
+          <p:cNvPicPr>
+            <a:picLocks noChangeAspect="1" noChangeArrowheads="1"/>
+          </p:cNvPicPr>
+          <p:nvPr/>
+        </p:nvPicPr>
+        <p:blipFill>
+          <a:blip r:embed="rId2">
+            <a:extLst>
+              <a:ext uri="{28A0092B-C50C-407E-A947-70E740481C1C}">
+                <a14:useLocalDpi xmlns:a14="http://schemas.microsoft.com/office/drawing/2010/main" val="0"/>
+              </a:ext>
+            </a:extLst>
+          </a:blip>
+          <a:srcRect/>
+          <a:stretch>
+            <a:fillRect/>
+          </a:stretch>
+        </p:blipFill>
+        <p:spPr bwMode="auto">
+          <a:xfrm>
+            <a:off x="3762926" y="2846432"/>
+            <a:ext cx="469900" cy="469900"/>
+          </a:xfrm>
+          <a:prstGeom prst="rect">
+            <a:avLst/>
+          </a:prstGeom>
+          <a:noFill/>
+          <a:ln>
+            <a:noFill/>
+          </a:ln>
+          <a:extLst>
+            <a:ext uri="{909E8E84-426E-40DD-AFC4-6F175D3DCCD1}">
+              <a14:hiddenFill xmlns:a14="http://schemas.microsoft.com/office/drawing/2010/main">
+                <a:solidFill>
+                  <a:srgbClr val="FFFFFF"/>
+                </a:solidFill>
+              </a14:hiddenFill>
+            </a:ext>
+            <a:ext uri="{91240B29-F687-4F45-9708-019B960494DF}">
+              <a14:hiddenLine xmlns:a14="http://schemas.microsoft.com/office/drawing/2010/main" w="9525">
+                <a:solidFill>
+                  <a:srgbClr val="000000"/>
+                </a:solidFill>
+                <a:miter lim="800000"/>
+                <a:headEnd/>
+                <a:tailEnd/>
+              </a14:hiddenLine>
+            </a:ext>
+          </a:extLst>
+        </p:spPr>
+      </p:pic>
+      <p:sp>
+        <p:nvSpPr>
+          <p:cNvPr id="16" name="TextBox 18">
+            <a:extLst>
+              <a:ext uri="{FF2B5EF4-FFF2-40B4-BE49-F238E27FC236}">
+                <a16:creationId xmlns:a16="http://schemas.microsoft.com/office/drawing/2014/main" id="{DDEA0899-FC07-CA42-997F-0DD775351307}"/>
+              </a:ext>
+            </a:extLst>
+          </p:cNvPr>
+          <p:cNvSpPr txBox="1">
+            <a:spLocks noChangeArrowheads="1"/>
+          </p:cNvSpPr>
+          <p:nvPr/>
+        </p:nvSpPr>
+        <p:spPr bwMode="auto">
+          <a:xfrm>
+            <a:off x="3113699" y="3291802"/>
+            <a:ext cx="1767152" cy="261610"/>
+          </a:xfrm>
+          <a:prstGeom prst="rect">
+            <a:avLst/>
+          </a:prstGeom>
+          <a:noFill/>
+          <a:ln>
+            <a:noFill/>
+          </a:ln>
+          <a:extLst>
+            <a:ext uri="{909E8E84-426E-40DD-AFC4-6F175D3DCCD1}">
+              <a14:hiddenFill xmlns:a14="http://schemas.microsoft.com/office/drawing/2010/main">
+                <a:solidFill>
+                  <a:srgbClr val="FFFFFF"/>
+                </a:solidFill>
+              </a14:hiddenFill>
+            </a:ext>
+            <a:ext uri="{91240B29-F687-4F45-9708-019B960494DF}">
+              <a14:hiddenLine xmlns:a14="http://schemas.microsoft.com/office/drawing/2010/main" w="9525">
+                <a:solidFill>
+                  <a:srgbClr val="000000"/>
+                </a:solidFill>
+                <a:miter lim="800000"/>
+                <a:headEnd/>
+                <a:tailEnd/>
+              </a14:hiddenLine>
+            </a:ext>
+          </a:extLst>
+        </p:spPr>
+        <p:txBody>
+          <a:bodyPr>
+            <a:spAutoFit/>
+          </a:bodyPr>
+          <a:lstStyle>
+            <a:lvl1pPr>
+              <a:defRPr>
+                <a:solidFill>
+                  <a:schemeClr val="tx1"/>
+                </a:solidFill>
+                <a:latin typeface="Calibri" panose="020F0502020204030204" pitchFamily="34" charset="0"/>
+              </a:defRPr>
+            </a:lvl1pPr>
+            <a:lvl2pPr marL="742950" indent="-285750">
+              <a:defRPr>
+                <a:solidFill>
+                  <a:schemeClr val="tx1"/>
+                </a:solidFill>
+                <a:latin typeface="Calibri" panose="020F0502020204030204" pitchFamily="34" charset="0"/>
+              </a:defRPr>
+            </a:lvl2pPr>
+            <a:lvl3pPr marL="1143000" indent="-228600">
+              <a:defRPr>
+                <a:solidFill>
+                  <a:schemeClr val="tx1"/>
+                </a:solidFill>
+                <a:latin typeface="Calibri" panose="020F0502020204030204" pitchFamily="34" charset="0"/>
+              </a:defRPr>
+            </a:lvl3pPr>
+            <a:lvl4pPr marL="1600200" indent="-228600">
+              <a:defRPr>
+                <a:solidFill>
+                  <a:schemeClr val="tx1"/>
+                </a:solidFill>
+                <a:latin typeface="Calibri" panose="020F0502020204030204" pitchFamily="34" charset="0"/>
+              </a:defRPr>
+            </a:lvl4pPr>
+            <a:lvl5pPr marL="2057400" indent="-228600">
+              <a:defRPr>
+                <a:solidFill>
+                  <a:schemeClr val="tx1"/>
+                </a:solidFill>
+                <a:latin typeface="Calibri" panose="020F0502020204030204" pitchFamily="34" charset="0"/>
+              </a:defRPr>
+            </a:lvl5pPr>
+            <a:lvl6pPr marL="2514600" indent="-228600" eaLnBrk="0" fontAlgn="base" hangingPunct="0">
+              <a:spcBef>
+                <a:spcPct val="0"/>
+              </a:spcBef>
+              <a:spcAft>
+                <a:spcPct val="0"/>
+              </a:spcAft>
+              <a:defRPr>
+                <a:solidFill>
+                  <a:schemeClr val="tx1"/>
+                </a:solidFill>
+                <a:latin typeface="Calibri" panose="020F0502020204030204" pitchFamily="34" charset="0"/>
+              </a:defRPr>
+            </a:lvl6pPr>
+            <a:lvl7pPr marL="2971800" indent="-228600" eaLnBrk="0" fontAlgn="base" hangingPunct="0">
+              <a:spcBef>
+                <a:spcPct val="0"/>
+              </a:spcBef>
+              <a:spcAft>
+                <a:spcPct val="0"/>
+              </a:spcAft>
+              <a:defRPr>
+                <a:solidFill>
+                  <a:schemeClr val="tx1"/>
+                </a:solidFill>
+                <a:latin typeface="Calibri" panose="020F0502020204030204" pitchFamily="34" charset="0"/>
+              </a:defRPr>
+            </a:lvl7pPr>
+            <a:lvl8pPr marL="3429000" indent="-228600" eaLnBrk="0" fontAlgn="base" hangingPunct="0">
+              <a:spcBef>
+                <a:spcPct val="0"/>
+              </a:spcBef>
+              <a:spcAft>
+                <a:spcPct val="0"/>
+              </a:spcAft>
+              <a:defRPr>
+                <a:solidFill>
+                  <a:schemeClr val="tx1"/>
+                </a:solidFill>
+                <a:latin typeface="Calibri" panose="020F0502020204030204" pitchFamily="34" charset="0"/>
+              </a:defRPr>
+            </a:lvl8pPr>
+            <a:lvl9pPr marL="3886200" indent="-228600" eaLnBrk="0" fontAlgn="base" hangingPunct="0">
+              <a:spcBef>
+                <a:spcPct val="0"/>
+              </a:spcBef>
+              <a:spcAft>
+                <a:spcPct val="0"/>
+              </a:spcAft>
+              <a:defRPr>
+                <a:solidFill>
+                  <a:schemeClr val="tx1"/>
+                </a:solidFill>
+                <a:latin typeface="Calibri" panose="020F0502020204030204" pitchFamily="34" charset="0"/>
+              </a:defRPr>
+            </a:lvl9pPr>
+          </a:lstStyle>
+          <a:p>
+            <a:pPr algn="ctr" eaLnBrk="1" hangingPunct="1"/>
+            <a:r>
+              <a:rPr lang="en-US" altLang="en-US" sz="1100" dirty="0">
+                <a:solidFill>
+                  <a:srgbClr val="232F3E"/>
+                </a:solidFill>
+                <a:latin typeface="Arial" panose="020B0604020202020204" pitchFamily="34" charset="0"/>
+                <a:cs typeface="Arial" panose="020B0604020202020204" pitchFamily="34" charset="0"/>
+              </a:rPr>
+              <a:t>LogStream Worker(s)</a:t>
+            </a:r>
+          </a:p>
+        </p:txBody>
+      </p:sp>
+      <p:pic>
+        <p:nvPicPr>
+          <p:cNvPr id="17" name="Graphic 19">
+            <a:extLst>
+              <a:ext uri="{FF2B5EF4-FFF2-40B4-BE49-F238E27FC236}">
+                <a16:creationId xmlns:a16="http://schemas.microsoft.com/office/drawing/2014/main" id="{069C40FE-0F83-0C4C-8D1A-525D31F12F7A}"/>
+              </a:ext>
+            </a:extLst>
+          </p:cNvPr>
+          <p:cNvPicPr>
+            <a:picLocks noChangeAspect="1" noChangeArrowheads="1"/>
+          </p:cNvPicPr>
+          <p:nvPr/>
+        </p:nvPicPr>
+        <p:blipFill>
+          <a:blip r:embed="rId2">
+            <a:extLst>
+              <a:ext uri="{28A0092B-C50C-407E-A947-70E740481C1C}">
+                <a14:useLocalDpi xmlns:a14="http://schemas.microsoft.com/office/drawing/2010/main" val="0"/>
+              </a:ext>
+            </a:extLst>
+          </a:blip>
+          <a:srcRect/>
+          <a:stretch>
+            <a:fillRect/>
+          </a:stretch>
+        </p:blipFill>
+        <p:spPr bwMode="auto">
+          <a:xfrm>
+            <a:off x="7965038" y="2846432"/>
+            <a:ext cx="469900" cy="469900"/>
+          </a:xfrm>
+          <a:prstGeom prst="rect">
+            <a:avLst/>
+          </a:prstGeom>
+          <a:noFill/>
+          <a:ln>
+            <a:noFill/>
+          </a:ln>
+          <a:extLst>
+            <a:ext uri="{909E8E84-426E-40DD-AFC4-6F175D3DCCD1}">
+              <a14:hiddenFill xmlns:a14="http://schemas.microsoft.com/office/drawing/2010/main">
+                <a:solidFill>
+                  <a:srgbClr val="FFFFFF"/>
+                </a:solidFill>
+              </a14:hiddenFill>
+            </a:ext>
+            <a:ext uri="{91240B29-F687-4F45-9708-019B960494DF}">
+              <a14:hiddenLine xmlns:a14="http://schemas.microsoft.com/office/drawing/2010/main" w="9525">
+                <a:solidFill>
+                  <a:srgbClr val="000000"/>
+                </a:solidFill>
+                <a:miter lim="800000"/>
+                <a:headEnd/>
+                <a:tailEnd/>
+              </a14:hiddenLine>
+            </a:ext>
+          </a:extLst>
+        </p:spPr>
+      </p:pic>
+      <p:sp>
+        <p:nvSpPr>
+          <p:cNvPr id="18" name="TextBox 20">
+            <a:extLst>
+              <a:ext uri="{FF2B5EF4-FFF2-40B4-BE49-F238E27FC236}">
+                <a16:creationId xmlns:a16="http://schemas.microsoft.com/office/drawing/2014/main" id="{5C508E39-5BFC-2346-8F1B-6783D5483008}"/>
+              </a:ext>
+            </a:extLst>
+          </p:cNvPr>
+          <p:cNvSpPr txBox="1">
+            <a:spLocks noChangeArrowheads="1"/>
+          </p:cNvSpPr>
+          <p:nvPr/>
+        </p:nvSpPr>
+        <p:spPr bwMode="auto">
+          <a:xfrm>
+            <a:off x="7316029" y="3291802"/>
+            <a:ext cx="1767152" cy="261610"/>
+          </a:xfrm>
+          <a:prstGeom prst="rect">
+            <a:avLst/>
+          </a:prstGeom>
+          <a:noFill/>
+          <a:ln>
+            <a:noFill/>
+          </a:ln>
+          <a:extLst>
+            <a:ext uri="{909E8E84-426E-40DD-AFC4-6F175D3DCCD1}">
+              <a14:hiddenFill xmlns:a14="http://schemas.microsoft.com/office/drawing/2010/main">
+                <a:solidFill>
+                  <a:srgbClr val="FFFFFF"/>
+                </a:solidFill>
+              </a14:hiddenFill>
+            </a:ext>
+            <a:ext uri="{91240B29-F687-4F45-9708-019B960494DF}">
+              <a14:hiddenLine xmlns:a14="http://schemas.microsoft.com/office/drawing/2010/main" w="9525">
+                <a:solidFill>
+                  <a:srgbClr val="000000"/>
+                </a:solidFill>
+                <a:miter lim="800000"/>
+                <a:headEnd/>
+                <a:tailEnd/>
+              </a14:hiddenLine>
+            </a:ext>
+          </a:extLst>
+        </p:spPr>
+        <p:txBody>
+          <a:bodyPr>
+            <a:spAutoFit/>
+          </a:bodyPr>
+          <a:lstStyle>
+            <a:lvl1pPr>
+              <a:defRPr>
+                <a:solidFill>
+                  <a:schemeClr val="tx1"/>
+                </a:solidFill>
+                <a:latin typeface="Calibri" panose="020F0502020204030204" pitchFamily="34" charset="0"/>
+              </a:defRPr>
+            </a:lvl1pPr>
+            <a:lvl2pPr marL="742950" indent="-285750">
+              <a:defRPr>
+                <a:solidFill>
+                  <a:schemeClr val="tx1"/>
+                </a:solidFill>
+                <a:latin typeface="Calibri" panose="020F0502020204030204" pitchFamily="34" charset="0"/>
+              </a:defRPr>
+            </a:lvl2pPr>
+            <a:lvl3pPr marL="1143000" indent="-228600">
+              <a:defRPr>
+                <a:solidFill>
+                  <a:schemeClr val="tx1"/>
+                </a:solidFill>
+                <a:latin typeface="Calibri" panose="020F0502020204030204" pitchFamily="34" charset="0"/>
+              </a:defRPr>
+            </a:lvl3pPr>
+            <a:lvl4pPr marL="1600200" indent="-228600">
+              <a:defRPr>
+                <a:solidFill>
+                  <a:schemeClr val="tx1"/>
+                </a:solidFill>
+                <a:latin typeface="Calibri" panose="020F0502020204030204" pitchFamily="34" charset="0"/>
+              </a:defRPr>
+            </a:lvl4pPr>
+            <a:lvl5pPr marL="2057400" indent="-228600">
+              <a:defRPr>
+                <a:solidFill>
+                  <a:schemeClr val="tx1"/>
+                </a:solidFill>
+                <a:latin typeface="Calibri" panose="020F0502020204030204" pitchFamily="34" charset="0"/>
+              </a:defRPr>
+            </a:lvl5pPr>
+            <a:lvl6pPr marL="2514600" indent="-228600" eaLnBrk="0" fontAlgn="base" hangingPunct="0">
+              <a:spcBef>
+                <a:spcPct val="0"/>
+              </a:spcBef>
+              <a:spcAft>
+                <a:spcPct val="0"/>
+              </a:spcAft>
+              <a:defRPr>
+                <a:solidFill>
+                  <a:schemeClr val="tx1"/>
+                </a:solidFill>
+                <a:latin typeface="Calibri" panose="020F0502020204030204" pitchFamily="34" charset="0"/>
+              </a:defRPr>
+            </a:lvl6pPr>
+            <a:lvl7pPr marL="2971800" indent="-228600" eaLnBrk="0" fontAlgn="base" hangingPunct="0">
+              <a:spcBef>
+                <a:spcPct val="0"/>
+              </a:spcBef>
+              <a:spcAft>
+                <a:spcPct val="0"/>
+              </a:spcAft>
+              <a:defRPr>
+                <a:solidFill>
+                  <a:schemeClr val="tx1"/>
+                </a:solidFill>
+                <a:latin typeface="Calibri" panose="020F0502020204030204" pitchFamily="34" charset="0"/>
+              </a:defRPr>
+            </a:lvl7pPr>
+            <a:lvl8pPr marL="3429000" indent="-228600" eaLnBrk="0" fontAlgn="base" hangingPunct="0">
+              <a:spcBef>
+                <a:spcPct val="0"/>
+              </a:spcBef>
+              <a:spcAft>
+                <a:spcPct val="0"/>
+              </a:spcAft>
+              <a:defRPr>
+                <a:solidFill>
+                  <a:schemeClr val="tx1"/>
+                </a:solidFill>
+                <a:latin typeface="Calibri" panose="020F0502020204030204" pitchFamily="34" charset="0"/>
+              </a:defRPr>
+            </a:lvl8pPr>
+            <a:lvl9pPr marL="3886200" indent="-228600" eaLnBrk="0" fontAlgn="base" hangingPunct="0">
+              <a:spcBef>
+                <a:spcPct val="0"/>
+              </a:spcBef>
+              <a:spcAft>
+                <a:spcPct val="0"/>
+              </a:spcAft>
+              <a:defRPr>
+                <a:solidFill>
+                  <a:schemeClr val="tx1"/>
+                </a:solidFill>
+                <a:latin typeface="Calibri" panose="020F0502020204030204" pitchFamily="34" charset="0"/>
+              </a:defRPr>
+            </a:lvl9pPr>
+          </a:lstStyle>
+          <a:p>
+            <a:pPr algn="ctr"/>
+            <a:r>
+              <a:rPr lang="en-US" altLang="en-US" sz="1100" dirty="0">
+                <a:solidFill>
+                  <a:srgbClr val="232F3E"/>
+                </a:solidFill>
+                <a:latin typeface="Arial" panose="020B0604020202020204" pitchFamily="34" charset="0"/>
+                <a:cs typeface="Arial" panose="020B0604020202020204" pitchFamily="34" charset="0"/>
+              </a:rPr>
+              <a:t>LogStream Worker(s)</a:t>
+            </a:r>
+          </a:p>
+        </p:txBody>
+      </p:sp>
+      <p:sp>
+        <p:nvSpPr>
+          <p:cNvPr id="25" name="Rectangle 24">
+            <a:extLst>
+              <a:ext uri="{FF2B5EF4-FFF2-40B4-BE49-F238E27FC236}">
+                <a16:creationId xmlns:a16="http://schemas.microsoft.com/office/drawing/2014/main" id="{B4C85341-B100-7B4F-A9EE-0917F23970BB}"/>
+              </a:ext>
+            </a:extLst>
+          </p:cNvPr>
+          <p:cNvSpPr/>
+          <p:nvPr/>
+        </p:nvSpPr>
+        <p:spPr>
+          <a:xfrm>
+            <a:off x="3035851" y="2700382"/>
+            <a:ext cx="6118225" cy="969963"/>
+          </a:xfrm>
+          <a:prstGeom prst="rect">
+            <a:avLst/>
+          </a:prstGeom>
+          <a:noFill/>
+          <a:ln w="12700">
+            <a:solidFill>
+              <a:srgbClr val="D86613"/>
+            </a:solidFill>
+            <a:prstDash val="dash"/>
+          </a:ln>
+        </p:spPr>
+        <p:style>
+          <a:lnRef idx="2">
+            <a:schemeClr val="accent1">
+              <a:shade val="50000"/>
+            </a:schemeClr>
+          </a:lnRef>
+          <a:fillRef idx="1">
+            <a:schemeClr val="accent1"/>
+          </a:fillRef>
+          <a:effectRef idx="0">
+            <a:schemeClr val="accent1"/>
+          </a:effectRef>
+          <a:fontRef idx="minor">
+            <a:schemeClr val="lt1"/>
+          </a:fontRef>
+        </p:style>
+        <p:txBody>
+          <a:bodyPr tIns="91440"/>
+          <a:lstStyle/>
+          <a:p>
+            <a:pPr algn="ctr" eaLnBrk="1" fontAlgn="auto" hangingPunct="1">
+              <a:spcBef>
+                <a:spcPts val="0"/>
+              </a:spcBef>
+              <a:spcAft>
+                <a:spcPts val="0"/>
+              </a:spcAft>
+              <a:defRPr/>
+            </a:pPr>
+            <a:endParaRPr lang="en-US" sz="1200" dirty="0">
+              <a:solidFill>
+                <a:srgbClr val="D86613"/>
+              </a:solidFill>
+              <a:latin typeface="Arial" panose="020B0604020202020204" pitchFamily="34" charset="0"/>
+              <a:cs typeface="Arial" panose="020B0604020202020204" pitchFamily="34" charset="0"/>
+            </a:endParaRPr>
+          </a:p>
+          <a:p>
+            <a:pPr algn="ctr" eaLnBrk="1" fontAlgn="auto" hangingPunct="1">
+              <a:spcBef>
+                <a:spcPts val="0"/>
+              </a:spcBef>
+              <a:spcAft>
+                <a:spcPts val="0"/>
+              </a:spcAft>
+              <a:defRPr/>
+            </a:pPr>
+            <a:endParaRPr lang="en-US" sz="1200" dirty="0">
+              <a:solidFill>
+                <a:srgbClr val="D86613"/>
+              </a:solidFill>
+              <a:latin typeface="Arial" panose="020B0604020202020204" pitchFamily="34" charset="0"/>
+              <a:cs typeface="Arial" panose="020B0604020202020204" pitchFamily="34" charset="0"/>
+            </a:endParaRPr>
+          </a:p>
+          <a:p>
+            <a:pPr algn="ctr" eaLnBrk="1" fontAlgn="auto" hangingPunct="1">
+              <a:spcBef>
+                <a:spcPts val="0"/>
+              </a:spcBef>
+              <a:spcAft>
+                <a:spcPts val="0"/>
+              </a:spcAft>
+              <a:defRPr/>
+            </a:pPr>
+            <a:r>
+              <a:rPr lang="en-US" sz="1200" dirty="0">
+                <a:solidFill>
+                  <a:srgbClr val="D86613"/>
+                </a:solidFill>
+                <a:latin typeface="Arial" panose="020B0604020202020204" pitchFamily="34" charset="0"/>
+                <a:cs typeface="Arial" panose="020B0604020202020204" pitchFamily="34" charset="0"/>
+              </a:rPr>
+              <a:t>Auto Scaling group</a:t>
+            </a:r>
+          </a:p>
+        </p:txBody>
+      </p:sp>
+      <p:pic>
+        <p:nvPicPr>
+          <p:cNvPr id="27" name="Graphic 26">
+            <a:extLst>
+              <a:ext uri="{FF2B5EF4-FFF2-40B4-BE49-F238E27FC236}">
+                <a16:creationId xmlns:a16="http://schemas.microsoft.com/office/drawing/2014/main" id="{11D10E49-1F57-CC41-9751-42D8C0FC2542}"/>
+              </a:ext>
+            </a:extLst>
+          </p:cNvPr>
+          <p:cNvPicPr>
+            <a:picLocks noChangeAspect="1"/>
+          </p:cNvPicPr>
+          <p:nvPr/>
+        </p:nvPicPr>
+        <p:blipFill>
+          <a:blip r:embed="rId3">
+            <a:extLst>
+              <a:ext uri="{96DAC541-7B7A-43D3-8B79-37D633B846F1}">
+                <asvg:svgBlip xmlns:asvg="http://schemas.microsoft.com/office/drawing/2016/SVG/main" r:embed="rId4"/>
+              </a:ext>
+            </a:extLst>
+          </a:blip>
+          <a:srcRect/>
+          <a:stretch/>
+        </p:blipFill>
+        <p:spPr>
+          <a:xfrm>
+            <a:off x="528431" y="1046687"/>
+            <a:ext cx="381000" cy="381000"/>
+          </a:xfrm>
+          <a:prstGeom prst="rect">
+            <a:avLst/>
+          </a:prstGeom>
+        </p:spPr>
+      </p:pic>
+      <p:pic>
+        <p:nvPicPr>
+          <p:cNvPr id="28" name="Graphic 27">
+            <a:extLst>
+              <a:ext uri="{FF2B5EF4-FFF2-40B4-BE49-F238E27FC236}">
+                <a16:creationId xmlns:a16="http://schemas.microsoft.com/office/drawing/2014/main" id="{4BCE0EE9-90B5-2445-9B83-FE7EEC3C8A62}"/>
+              </a:ext>
+            </a:extLst>
+          </p:cNvPr>
+          <p:cNvPicPr>
+            <a:picLocks noChangeAspect="1"/>
+          </p:cNvPicPr>
+          <p:nvPr/>
+        </p:nvPicPr>
+        <p:blipFill>
+          <a:blip r:embed="rId5">
+            <a:extLst>
+              <a:ext uri="{96DAC541-7B7A-43D3-8B79-37D633B846F1}">
+                <asvg:svgBlip xmlns:asvg="http://schemas.microsoft.com/office/drawing/2016/SVG/main" r:embed="rId6"/>
+              </a:ext>
+            </a:extLst>
+          </a:blip>
+          <a:stretch>
+            <a:fillRect/>
+          </a:stretch>
+        </p:blipFill>
+        <p:spPr>
+          <a:xfrm>
+            <a:off x="912002" y="2352881"/>
+            <a:ext cx="381000" cy="381000"/>
+          </a:xfrm>
+          <a:prstGeom prst="rect">
+            <a:avLst/>
+          </a:prstGeom>
+        </p:spPr>
+      </p:pic>
+      <p:pic>
+        <p:nvPicPr>
+          <p:cNvPr id="29" name="Graphic 28">
+            <a:extLst>
+              <a:ext uri="{FF2B5EF4-FFF2-40B4-BE49-F238E27FC236}">
+                <a16:creationId xmlns:a16="http://schemas.microsoft.com/office/drawing/2014/main" id="{A32C60DA-6286-1641-8411-A8B80488A73E}"/>
+              </a:ext>
+            </a:extLst>
+          </p:cNvPr>
+          <p:cNvPicPr>
+            <a:picLocks noChangeAspect="1"/>
+          </p:cNvPicPr>
+          <p:nvPr/>
+        </p:nvPicPr>
+        <p:blipFill>
+          <a:blip r:embed="rId7">
+            <a:extLst>
+              <a:ext uri="{96DAC541-7B7A-43D3-8B79-37D633B846F1}">
+                <asvg:svgBlip xmlns:asvg="http://schemas.microsoft.com/office/drawing/2016/SVG/main" r:embed="rId8"/>
+              </a:ext>
+            </a:extLst>
+          </a:blip>
+          <a:stretch>
+            <a:fillRect/>
+          </a:stretch>
+        </p:blipFill>
+        <p:spPr>
+          <a:xfrm>
+            <a:off x="5902876" y="2697320"/>
+            <a:ext cx="381000" cy="381000"/>
+          </a:xfrm>
+          <a:prstGeom prst="rect">
+            <a:avLst/>
+          </a:prstGeom>
+        </p:spPr>
+      </p:pic>
+      <p:pic>
+        <p:nvPicPr>
+          <p:cNvPr id="31" name="Graphic 17">
+            <a:extLst>
+              <a:ext uri="{FF2B5EF4-FFF2-40B4-BE49-F238E27FC236}">
+                <a16:creationId xmlns:a16="http://schemas.microsoft.com/office/drawing/2014/main" id="{C8AE9927-409B-884E-837F-9AB72DF9322D}"/>
+              </a:ext>
+            </a:extLst>
+          </p:cNvPr>
+          <p:cNvPicPr>
+            <a:picLocks noChangeAspect="1" noChangeArrowheads="1"/>
+          </p:cNvPicPr>
+          <p:nvPr/>
+        </p:nvPicPr>
+        <p:blipFill>
+          <a:blip r:embed="rId2">
+            <a:extLst>
+              <a:ext uri="{28A0092B-C50C-407E-A947-70E740481C1C}">
+                <a14:useLocalDpi xmlns:a14="http://schemas.microsoft.com/office/drawing/2010/main" val="0"/>
+              </a:ext>
+            </a:extLst>
+          </a:blip>
+          <a:srcRect/>
+          <a:stretch>
+            <a:fillRect/>
+          </a:stretch>
+        </p:blipFill>
+        <p:spPr bwMode="auto">
+          <a:xfrm>
+            <a:off x="5854937" y="1705226"/>
+            <a:ext cx="469900" cy="469900"/>
+          </a:xfrm>
+          <a:prstGeom prst="rect">
+            <a:avLst/>
+          </a:prstGeom>
+          <a:noFill/>
+          <a:ln>
+            <a:noFill/>
+          </a:ln>
+          <a:extLst>
+            <a:ext uri="{909E8E84-426E-40DD-AFC4-6F175D3DCCD1}">
+              <a14:hiddenFill xmlns:a14="http://schemas.microsoft.com/office/drawing/2010/main">
+                <a:solidFill>
+                  <a:srgbClr val="FFFFFF"/>
+                </a:solidFill>
+              </a14:hiddenFill>
+            </a:ext>
+            <a:ext uri="{91240B29-F687-4F45-9708-019B960494DF}">
+              <a14:hiddenLine xmlns:a14="http://schemas.microsoft.com/office/drawing/2010/main" w="9525">
+                <a:solidFill>
+                  <a:srgbClr val="000000"/>
+                </a:solidFill>
+                <a:miter lim="800000"/>
+                <a:headEnd/>
+                <a:tailEnd/>
+              </a14:hiddenLine>
+            </a:ext>
+          </a:extLst>
+        </p:spPr>
+      </p:pic>
+      <p:grpSp>
+        <p:nvGrpSpPr>
+          <p:cNvPr id="63" name="Group 62">
+            <a:extLst>
+              <a:ext uri="{FF2B5EF4-FFF2-40B4-BE49-F238E27FC236}">
+                <a16:creationId xmlns:a16="http://schemas.microsoft.com/office/drawing/2014/main" id="{7A888609-1B15-0B43-B244-18159CDA4DFC}"/>
+              </a:ext>
+            </a:extLst>
+          </p:cNvPr>
+          <p:cNvGrpSpPr/>
+          <p:nvPr/>
+        </p:nvGrpSpPr>
+        <p:grpSpPr>
+          <a:xfrm>
+            <a:off x="1270006" y="4348320"/>
+            <a:ext cx="4871245" cy="1376276"/>
+            <a:chOff x="1973386" y="4348320"/>
+            <a:chExt cx="4871245" cy="1376276"/>
+          </a:xfrm>
+        </p:grpSpPr>
+        <p:sp>
+          <p:nvSpPr>
+            <p:cNvPr id="34" name="Rectangle 33">
+              <a:extLst>
+                <a:ext uri="{FF2B5EF4-FFF2-40B4-BE49-F238E27FC236}">
+                  <a16:creationId xmlns:a16="http://schemas.microsoft.com/office/drawing/2014/main" id="{FFF835A2-34CA-8247-BE9B-0C9C4A4C0B66}"/>
+                </a:ext>
+              </a:extLst>
+            </p:cNvPr>
+            <p:cNvSpPr/>
+            <p:nvPr/>
+          </p:nvSpPr>
+          <p:spPr>
+            <a:xfrm>
+              <a:off x="1973386" y="4348320"/>
+              <a:ext cx="4422913" cy="1376276"/>
+            </a:xfrm>
+            <a:prstGeom prst="rect">
+              <a:avLst/>
+            </a:prstGeom>
+            <a:noFill/>
+            <a:ln w="12700">
+              <a:solidFill>
+                <a:srgbClr val="5A6B86"/>
+              </a:solidFill>
+              <a:prstDash val="dash"/>
+            </a:ln>
+          </p:spPr>
+          <p:style>
+            <a:lnRef idx="2">
+              <a:schemeClr val="accent1">
+                <a:shade val="50000"/>
+              </a:schemeClr>
+            </a:lnRef>
+            <a:fillRef idx="1">
+              <a:schemeClr val="accent1"/>
+            </a:fillRef>
+            <a:effectRef idx="0">
+              <a:schemeClr val="accent1"/>
+            </a:effectRef>
+            <a:fontRef idx="minor">
+              <a:schemeClr val="lt1"/>
+            </a:fontRef>
+          </p:style>
+          <p:txBody>
+            <a:bodyPr tIns="91440"/>
+            <a:lstStyle/>
+            <a:p>
+              <a:pPr algn="ctr" eaLnBrk="1" fontAlgn="auto" hangingPunct="1">
+                <a:spcBef>
+                  <a:spcPts val="0"/>
+                </a:spcBef>
+                <a:spcAft>
+                  <a:spcPts val="0"/>
+                </a:spcAft>
+                <a:defRPr/>
+              </a:pPr>
+              <a:r>
+                <a:rPr lang="en-US" sz="1200" dirty="0">
+                  <a:solidFill>
+                    <a:srgbClr val="5A6B86"/>
+                  </a:solidFill>
+                  <a:latin typeface="Arial" panose="020B0604020202020204" pitchFamily="34" charset="0"/>
+                  <a:cs typeface="Arial" panose="020B0604020202020204" pitchFamily="34" charset="0"/>
+                </a:rPr>
+                <a:t>Sources</a:t>
+              </a:r>
+            </a:p>
+          </p:txBody>
+        </p:sp>
+        <p:grpSp>
+          <p:nvGrpSpPr>
+            <p:cNvPr id="40" name="Group 39">
+              <a:extLst>
+                <a:ext uri="{FF2B5EF4-FFF2-40B4-BE49-F238E27FC236}">
+                  <a16:creationId xmlns:a16="http://schemas.microsoft.com/office/drawing/2014/main" id="{CE2E9154-BE20-DE46-98D9-04F379FE211E}"/>
+                </a:ext>
+              </a:extLst>
+            </p:cNvPr>
+            <p:cNvGrpSpPr/>
+            <p:nvPr/>
+          </p:nvGrpSpPr>
+          <p:grpSpPr>
+            <a:xfrm>
+              <a:off x="2171294" y="4627816"/>
+              <a:ext cx="952505" cy="921352"/>
+              <a:chOff x="1465018" y="4401122"/>
+              <a:chExt cx="952505" cy="921352"/>
+            </a:xfrm>
+          </p:grpSpPr>
+          <p:pic>
+            <p:nvPicPr>
+              <p:cNvPr id="33" name="Graphic 64">
+                <a:extLst>
+                  <a:ext uri="{FF2B5EF4-FFF2-40B4-BE49-F238E27FC236}">
+                    <a16:creationId xmlns:a16="http://schemas.microsoft.com/office/drawing/2014/main" id="{79BF47A4-08AE-8049-AC4D-E1D96A210A9F}"/>
+                  </a:ext>
+                </a:extLst>
+              </p:cNvPr>
+              <p:cNvPicPr>
+                <a:picLocks noChangeAspect="1" noChangeArrowheads="1"/>
+              </p:cNvPicPr>
+              <p:nvPr/>
+            </p:nvPicPr>
+            <p:blipFill>
+              <a:blip r:embed="rId9">
+                <a:extLst>
+                  <a:ext uri="{28A0092B-C50C-407E-A947-70E740481C1C}">
+                    <a14:useLocalDpi xmlns:a14="http://schemas.microsoft.com/office/drawing/2010/main" val="0"/>
+                  </a:ext>
+                </a:extLst>
+              </a:blip>
+              <a:srcRect/>
+              <a:stretch>
+                <a:fillRect/>
+              </a:stretch>
+            </p:blipFill>
+            <p:spPr bwMode="auto">
+              <a:xfrm>
+                <a:off x="1712671" y="4401122"/>
+                <a:ext cx="457200" cy="457200"/>
+              </a:xfrm>
+              <a:prstGeom prst="rect">
+                <a:avLst/>
+              </a:prstGeom>
+              <a:noFill/>
+              <a:ln>
+                <a:noFill/>
+              </a:ln>
+              <a:extLst>
+                <a:ext uri="{909E8E84-426E-40DD-AFC4-6F175D3DCCD1}">
+                  <a14:hiddenFill xmlns:a14="http://schemas.microsoft.com/office/drawing/2010/main">
+                    <a:solidFill>
+                      <a:srgbClr val="FFFFFF"/>
+                    </a:solidFill>
+                  </a14:hiddenFill>
+                </a:ext>
+                <a:ext uri="{91240B29-F687-4F45-9708-019B960494DF}">
+                  <a14:hiddenLine xmlns:a14="http://schemas.microsoft.com/office/drawing/2010/main" w="9525">
+                    <a:solidFill>
+                      <a:srgbClr val="000000"/>
+                    </a:solidFill>
+                    <a:miter lim="800000"/>
+                    <a:headEnd/>
+                    <a:tailEnd/>
+                  </a14:hiddenLine>
+                </a:ext>
+              </a:extLst>
+            </p:spPr>
+          </p:pic>
+          <p:sp>
+            <p:nvSpPr>
+              <p:cNvPr id="36" name="TextBox 35">
+                <a:extLst>
+                  <a:ext uri="{FF2B5EF4-FFF2-40B4-BE49-F238E27FC236}">
+                    <a16:creationId xmlns:a16="http://schemas.microsoft.com/office/drawing/2014/main" id="{38D8309E-22F4-C44F-81B4-86B0B2131B31}"/>
+                  </a:ext>
+                </a:extLst>
+              </p:cNvPr>
+              <p:cNvSpPr txBox="1"/>
+              <p:nvPr/>
+            </p:nvSpPr>
+            <p:spPr>
+              <a:xfrm>
+                <a:off x="1465018" y="4891587"/>
+                <a:ext cx="952505" cy="430887"/>
+              </a:xfrm>
+              <a:prstGeom prst="rect">
+                <a:avLst/>
+              </a:prstGeom>
+              <a:noFill/>
+            </p:spPr>
+            <p:txBody>
+              <a:bodyPr wrap="none" rtlCol="0">
+                <a:spAutoFit/>
+              </a:bodyPr>
+              <a:lstStyle/>
+              <a:p>
+                <a:pPr algn="ctr"/>
+                <a:r>
+                  <a:rPr lang="en-US" sz="1100" dirty="0"/>
+                  <a:t>Amazon S3 </a:t>
+                </a:r>
+              </a:p>
+              <a:p>
+                <a:pPr algn="ctr"/>
+                <a:r>
+                  <a:rPr lang="en-US" sz="1100" dirty="0"/>
+                  <a:t>Bucket</a:t>
+                </a:r>
+              </a:p>
+            </p:txBody>
+          </p:sp>
+        </p:grpSp>
+        <p:grpSp>
+          <p:nvGrpSpPr>
+            <p:cNvPr id="41" name="Group 40">
+              <a:extLst>
+                <a:ext uri="{FF2B5EF4-FFF2-40B4-BE49-F238E27FC236}">
+                  <a16:creationId xmlns:a16="http://schemas.microsoft.com/office/drawing/2014/main" id="{80BE00D8-31BB-1246-A495-25FF63F5091D}"/>
+                </a:ext>
+              </a:extLst>
+            </p:cNvPr>
+            <p:cNvGrpSpPr/>
+            <p:nvPr/>
+          </p:nvGrpSpPr>
+          <p:grpSpPr>
+            <a:xfrm>
+              <a:off x="3662859" y="4697042"/>
+              <a:ext cx="1039067" cy="752709"/>
+              <a:chOff x="2427626" y="4401122"/>
+              <a:chExt cx="1039067" cy="752709"/>
+            </a:xfrm>
+          </p:grpSpPr>
+          <p:pic>
+            <p:nvPicPr>
+              <p:cNvPr id="35" name="Graphic 26">
+                <a:extLst>
+                  <a:ext uri="{FF2B5EF4-FFF2-40B4-BE49-F238E27FC236}">
+                    <a16:creationId xmlns:a16="http://schemas.microsoft.com/office/drawing/2014/main" id="{5A28506D-F10F-E74A-9376-0E76D49C8959}"/>
+                  </a:ext>
+                </a:extLst>
+              </p:cNvPr>
+              <p:cNvPicPr>
+                <a:picLocks noChangeAspect="1" noChangeArrowheads="1"/>
+              </p:cNvPicPr>
+              <p:nvPr/>
+            </p:nvPicPr>
+            <p:blipFill>
+              <a:blip r:embed="rId10">
+                <a:extLst>
+                  <a:ext uri="{28A0092B-C50C-407E-A947-70E740481C1C}">
+                    <a14:useLocalDpi xmlns:a14="http://schemas.microsoft.com/office/drawing/2010/main" val="0"/>
+                  </a:ext>
+                </a:extLst>
+              </a:blip>
+              <a:srcRect/>
+              <a:stretch>
+                <a:fillRect/>
+              </a:stretch>
+            </p:blipFill>
+            <p:spPr bwMode="auto">
+              <a:xfrm>
+                <a:off x="2718559" y="4401122"/>
+                <a:ext cx="457200" cy="457200"/>
+              </a:xfrm>
+              <a:prstGeom prst="rect">
+                <a:avLst/>
+              </a:prstGeom>
+              <a:noFill/>
+              <a:ln>
+                <a:noFill/>
+              </a:ln>
+              <a:extLst>
+                <a:ext uri="{909E8E84-426E-40DD-AFC4-6F175D3DCCD1}">
+                  <a14:hiddenFill xmlns:a14="http://schemas.microsoft.com/office/drawing/2010/main">
+                    <a:solidFill>
+                      <a:srgbClr val="FFFFFF"/>
+                    </a:solidFill>
+                  </a14:hiddenFill>
+                </a:ext>
+                <a:ext uri="{91240B29-F687-4F45-9708-019B960494DF}">
+                  <a14:hiddenLine xmlns:a14="http://schemas.microsoft.com/office/drawing/2010/main" w="9525">
+                    <a:solidFill>
+                      <a:srgbClr val="000000"/>
+                    </a:solidFill>
+                    <a:miter lim="800000"/>
+                    <a:headEnd/>
+                    <a:tailEnd/>
+                  </a14:hiddenLine>
+                </a:ext>
+              </a:extLst>
+            </p:spPr>
+          </p:pic>
+          <p:sp>
+            <p:nvSpPr>
+              <p:cNvPr id="37" name="TextBox 36">
+                <a:extLst>
+                  <a:ext uri="{FF2B5EF4-FFF2-40B4-BE49-F238E27FC236}">
+                    <a16:creationId xmlns:a16="http://schemas.microsoft.com/office/drawing/2014/main" id="{C81B05E9-DAC9-D64C-8413-C9833BC8761A}"/>
+                  </a:ext>
+                </a:extLst>
+              </p:cNvPr>
+              <p:cNvSpPr txBox="1"/>
+              <p:nvPr/>
+            </p:nvSpPr>
+            <p:spPr>
+              <a:xfrm>
+                <a:off x="2427626" y="4892221"/>
+                <a:ext cx="1039067" cy="261610"/>
+              </a:xfrm>
+              <a:prstGeom prst="rect">
+                <a:avLst/>
+              </a:prstGeom>
+              <a:noFill/>
+            </p:spPr>
+            <p:txBody>
+              <a:bodyPr wrap="none" rtlCol="0">
+                <a:spAutoFit/>
+              </a:bodyPr>
+              <a:lstStyle/>
+              <a:p>
+                <a:pPr algn="ctr"/>
+                <a:r>
+                  <a:rPr lang="en-US" sz="1100" dirty="0"/>
+                  <a:t>Amazon SQS</a:t>
+                </a:r>
+              </a:p>
+            </p:txBody>
+          </p:sp>
+        </p:grpSp>
+        <p:grpSp>
+          <p:nvGrpSpPr>
+            <p:cNvPr id="42" name="Group 41">
+              <a:extLst>
+                <a:ext uri="{FF2B5EF4-FFF2-40B4-BE49-F238E27FC236}">
+                  <a16:creationId xmlns:a16="http://schemas.microsoft.com/office/drawing/2014/main" id="{0BD9EA3E-EA91-7E4F-BAFA-A0FCD90699D9}"/>
+                </a:ext>
+              </a:extLst>
+            </p:cNvPr>
+            <p:cNvGrpSpPr/>
+            <p:nvPr/>
+          </p:nvGrpSpPr>
+          <p:grpSpPr>
+            <a:xfrm>
+              <a:off x="4564981" y="4721790"/>
+              <a:ext cx="2279650" cy="727961"/>
+              <a:chOff x="2875556" y="4410481"/>
+              <a:chExt cx="2279650" cy="727961"/>
+            </a:xfrm>
+          </p:grpSpPr>
+          <p:pic>
+            <p:nvPicPr>
+              <p:cNvPr id="38" name="Graphic 24">
+                <a:extLst>
+                  <a:ext uri="{FF2B5EF4-FFF2-40B4-BE49-F238E27FC236}">
+                    <a16:creationId xmlns:a16="http://schemas.microsoft.com/office/drawing/2014/main" id="{1B70C626-1642-F143-AAE7-697AE9D78BAF}"/>
+                  </a:ext>
+                </a:extLst>
+              </p:cNvPr>
+              <p:cNvPicPr>
+                <a:picLocks noChangeAspect="1" noChangeArrowheads="1"/>
+              </p:cNvPicPr>
+              <p:nvPr/>
+            </p:nvPicPr>
+            <p:blipFill>
+              <a:blip r:embed="rId11">
+                <a:extLst>
+                  <a:ext uri="{28A0092B-C50C-407E-A947-70E740481C1C}">
+                    <a14:useLocalDpi xmlns:a14="http://schemas.microsoft.com/office/drawing/2010/main" val="0"/>
+                  </a:ext>
+                </a:extLst>
+              </a:blip>
+              <a:srcRect/>
+              <a:stretch>
+                <a:fillRect/>
+              </a:stretch>
+            </p:blipFill>
+            <p:spPr bwMode="auto">
+              <a:xfrm>
+                <a:off x="3788568" y="4410481"/>
+                <a:ext cx="457200" cy="457200"/>
+              </a:xfrm>
+              <a:prstGeom prst="rect">
+                <a:avLst/>
+              </a:prstGeom>
+              <a:noFill/>
+              <a:ln>
+                <a:noFill/>
+              </a:ln>
+              <a:extLst>
+                <a:ext uri="{909E8E84-426E-40DD-AFC4-6F175D3DCCD1}">
+                  <a14:hiddenFill xmlns:a14="http://schemas.microsoft.com/office/drawing/2010/main">
+                    <a:solidFill>
+                      <a:srgbClr val="FFFFFF"/>
+                    </a:solidFill>
+                  </a14:hiddenFill>
+                </a:ext>
+                <a:ext uri="{91240B29-F687-4F45-9708-019B960494DF}">
+                  <a14:hiddenLine xmlns:a14="http://schemas.microsoft.com/office/drawing/2010/main" w="9525">
+                    <a:solidFill>
+                      <a:srgbClr val="000000"/>
+                    </a:solidFill>
+                    <a:miter lim="800000"/>
+                    <a:headEnd/>
+                    <a:tailEnd/>
+                  </a14:hiddenLine>
+                </a:ext>
+              </a:extLst>
+            </p:spPr>
+          </p:pic>
+          <p:sp>
+            <p:nvSpPr>
+              <p:cNvPr id="39" name="TextBox 19">
+                <a:extLst>
+                  <a:ext uri="{FF2B5EF4-FFF2-40B4-BE49-F238E27FC236}">
+                    <a16:creationId xmlns:a16="http://schemas.microsoft.com/office/drawing/2014/main" id="{BC5DDDBB-A218-6A45-849A-CCFB91E061E5}"/>
+                  </a:ext>
+                </a:extLst>
+              </p:cNvPr>
+              <p:cNvSpPr txBox="1">
+                <a:spLocks noChangeArrowheads="1"/>
+              </p:cNvSpPr>
+              <p:nvPr/>
+            </p:nvSpPr>
+            <p:spPr bwMode="auto">
+              <a:xfrm>
+                <a:off x="2875556" y="4876832"/>
+                <a:ext cx="2279650" cy="261610"/>
+              </a:xfrm>
+              <a:prstGeom prst="rect">
+                <a:avLst/>
+              </a:prstGeom>
+              <a:noFill/>
+              <a:ln>
+                <a:noFill/>
+              </a:ln>
+              <a:extLst>
+                <a:ext uri="{909E8E84-426E-40DD-AFC4-6F175D3DCCD1}">
+                  <a14:hiddenFill xmlns:a14="http://schemas.microsoft.com/office/drawing/2010/main">
+                    <a:solidFill>
+                      <a:srgbClr val="FFFFFF"/>
+                    </a:solidFill>
+                  </a14:hiddenFill>
+                </a:ext>
+                <a:ext uri="{91240B29-F687-4F45-9708-019B960494DF}">
+                  <a14:hiddenLine xmlns:a14="http://schemas.microsoft.com/office/drawing/2010/main" w="9525">
+                    <a:solidFill>
+                      <a:srgbClr val="000000"/>
+                    </a:solidFill>
+                    <a:miter lim="800000"/>
+                    <a:headEnd/>
+                    <a:tailEnd/>
+                  </a14:hiddenLine>
+                </a:ext>
+              </a:extLst>
+            </p:spPr>
+            <p:txBody>
+              <a:bodyPr>
+                <a:spAutoFit/>
+              </a:bodyPr>
+              <a:lstStyle>
+                <a:lvl1pPr>
+                  <a:defRPr>
+                    <a:solidFill>
+                      <a:schemeClr val="tx1"/>
+                    </a:solidFill>
+                    <a:latin typeface="Calibri" panose="020F0502020204030204" pitchFamily="34" charset="0"/>
+                  </a:defRPr>
+                </a:lvl1pPr>
+                <a:lvl2pPr marL="742950" indent="-285750">
+                  <a:defRPr>
+                    <a:solidFill>
+                      <a:schemeClr val="tx1"/>
+                    </a:solidFill>
+                    <a:latin typeface="Calibri" panose="020F0502020204030204" pitchFamily="34" charset="0"/>
+                  </a:defRPr>
+                </a:lvl2pPr>
+                <a:lvl3pPr marL="1143000" indent="-228600">
+                  <a:defRPr>
+                    <a:solidFill>
+                      <a:schemeClr val="tx1"/>
+                    </a:solidFill>
+                    <a:latin typeface="Calibri" panose="020F0502020204030204" pitchFamily="34" charset="0"/>
+                  </a:defRPr>
+                </a:lvl3pPr>
+                <a:lvl4pPr marL="1600200" indent="-228600">
+                  <a:defRPr>
+                    <a:solidFill>
+                      <a:schemeClr val="tx1"/>
+                    </a:solidFill>
+                    <a:latin typeface="Calibri" panose="020F0502020204030204" pitchFamily="34" charset="0"/>
+                  </a:defRPr>
+                </a:lvl4pPr>
+                <a:lvl5pPr marL="2057400" indent="-228600">
+                  <a:defRPr>
+                    <a:solidFill>
+                      <a:schemeClr val="tx1"/>
+                    </a:solidFill>
+                    <a:latin typeface="Calibri" panose="020F0502020204030204" pitchFamily="34" charset="0"/>
+                  </a:defRPr>
+                </a:lvl5pPr>
+                <a:lvl6pPr marL="2514600" indent="-228600" eaLnBrk="0" fontAlgn="base" hangingPunct="0">
+                  <a:spcBef>
+                    <a:spcPct val="0"/>
+                  </a:spcBef>
+                  <a:spcAft>
+                    <a:spcPct val="0"/>
+                  </a:spcAft>
+                  <a:defRPr>
+                    <a:solidFill>
+                      <a:schemeClr val="tx1"/>
+                    </a:solidFill>
+                    <a:latin typeface="Calibri" panose="020F0502020204030204" pitchFamily="34" charset="0"/>
+                  </a:defRPr>
+                </a:lvl6pPr>
+                <a:lvl7pPr marL="2971800" indent="-228600" eaLnBrk="0" fontAlgn="base" hangingPunct="0">
+                  <a:spcBef>
+                    <a:spcPct val="0"/>
+                  </a:spcBef>
+                  <a:spcAft>
+                    <a:spcPct val="0"/>
+                  </a:spcAft>
+                  <a:defRPr>
+                    <a:solidFill>
+                      <a:schemeClr val="tx1"/>
+                    </a:solidFill>
+                    <a:latin typeface="Calibri" panose="020F0502020204030204" pitchFamily="34" charset="0"/>
+                  </a:defRPr>
+                </a:lvl7pPr>
+                <a:lvl8pPr marL="3429000" indent="-228600" eaLnBrk="0" fontAlgn="base" hangingPunct="0">
+                  <a:spcBef>
+                    <a:spcPct val="0"/>
+                  </a:spcBef>
+                  <a:spcAft>
+                    <a:spcPct val="0"/>
+                  </a:spcAft>
+                  <a:defRPr>
+                    <a:solidFill>
+                      <a:schemeClr val="tx1"/>
+                    </a:solidFill>
+                    <a:latin typeface="Calibri" panose="020F0502020204030204" pitchFamily="34" charset="0"/>
+                  </a:defRPr>
+                </a:lvl8pPr>
+                <a:lvl9pPr marL="3886200" indent="-228600" eaLnBrk="0" fontAlgn="base" hangingPunct="0">
+                  <a:spcBef>
+                    <a:spcPct val="0"/>
+                  </a:spcBef>
+                  <a:spcAft>
+                    <a:spcPct val="0"/>
+                  </a:spcAft>
+                  <a:defRPr>
+                    <a:solidFill>
+                      <a:schemeClr val="tx1"/>
+                    </a:solidFill>
+                    <a:latin typeface="Calibri" panose="020F0502020204030204" pitchFamily="34" charset="0"/>
+                  </a:defRPr>
+                </a:lvl9pPr>
+              </a:lstStyle>
+              <a:p>
+                <a:pPr algn="ctr" eaLnBrk="1" hangingPunct="1"/>
+                <a:r>
+                  <a:rPr lang="en-US" altLang="en-US" sz="1100" dirty="0">
+                    <a:latin typeface="Arial" panose="020B0604020202020204" pitchFamily="34" charset="0"/>
+                    <a:ea typeface="Amazon Ember" panose="020B0603020204020204" pitchFamily="34" charset="0"/>
+                    <a:cs typeface="Arial" panose="020B0604020202020204" pitchFamily="34" charset="0"/>
+                  </a:rPr>
+                  <a:t>Amazon Kinesis</a:t>
+                </a:r>
+              </a:p>
+            </p:txBody>
+          </p:sp>
+        </p:grpSp>
+      </p:grpSp>
+      <p:sp>
+        <p:nvSpPr>
+          <p:cNvPr id="43" name="Rectangle 42">
+            <a:extLst>
+              <a:ext uri="{FF2B5EF4-FFF2-40B4-BE49-F238E27FC236}">
+                <a16:creationId xmlns:a16="http://schemas.microsoft.com/office/drawing/2014/main" id="{7BDD466C-4694-FA4C-9C0A-F5F723F0D86B}"/>
+              </a:ext>
+            </a:extLst>
+          </p:cNvPr>
+          <p:cNvSpPr/>
+          <p:nvPr/>
+        </p:nvSpPr>
+        <p:spPr>
+          <a:xfrm>
+            <a:off x="6499083" y="4359101"/>
+            <a:ext cx="4422913" cy="1376276"/>
+          </a:xfrm>
+          <a:prstGeom prst="rect">
+            <a:avLst/>
+          </a:prstGeom>
+          <a:noFill/>
+          <a:ln w="12700">
+            <a:solidFill>
+              <a:srgbClr val="5A6B86"/>
+            </a:solidFill>
+            <a:prstDash val="dash"/>
+          </a:ln>
+        </p:spPr>
+        <p:style>
+          <a:lnRef idx="2">
+            <a:schemeClr val="accent1">
+              <a:shade val="50000"/>
+            </a:schemeClr>
+          </a:lnRef>
+          <a:fillRef idx="1">
+            <a:schemeClr val="accent1"/>
+          </a:fillRef>
+          <a:effectRef idx="0">
+            <a:schemeClr val="accent1"/>
+          </a:effectRef>
+          <a:fontRef idx="minor">
+            <a:schemeClr val="lt1"/>
+          </a:fontRef>
+        </p:style>
+        <p:txBody>
+          <a:bodyPr tIns="91440"/>
+          <a:lstStyle/>
+          <a:p>
+            <a:pPr algn="ctr" eaLnBrk="1" fontAlgn="auto" hangingPunct="1">
+              <a:spcBef>
+                <a:spcPts val="0"/>
+              </a:spcBef>
+              <a:spcAft>
+                <a:spcPts val="0"/>
+              </a:spcAft>
+              <a:defRPr/>
+            </a:pPr>
+            <a:r>
+              <a:rPr lang="en-US" sz="1200" dirty="0">
+                <a:solidFill>
+                  <a:srgbClr val="5A6B86"/>
+                </a:solidFill>
+                <a:latin typeface="Arial" panose="020B0604020202020204" pitchFamily="34" charset="0"/>
+                <a:cs typeface="Arial" panose="020B0604020202020204" pitchFamily="34" charset="0"/>
+              </a:rPr>
+              <a:t>Destinations</a:t>
+            </a:r>
+          </a:p>
+        </p:txBody>
+      </p:sp>
+      <p:grpSp>
+        <p:nvGrpSpPr>
+          <p:cNvPr id="44" name="Group 43">
+            <a:extLst>
+              <a:ext uri="{FF2B5EF4-FFF2-40B4-BE49-F238E27FC236}">
+                <a16:creationId xmlns:a16="http://schemas.microsoft.com/office/drawing/2014/main" id="{1810373F-F5A7-3345-9EF5-C5FA70043564}"/>
+              </a:ext>
+            </a:extLst>
+          </p:cNvPr>
+          <p:cNvGrpSpPr/>
+          <p:nvPr/>
+        </p:nvGrpSpPr>
+        <p:grpSpPr>
+          <a:xfrm>
+            <a:off x="6684177" y="4595709"/>
+            <a:ext cx="952505" cy="921352"/>
+            <a:chOff x="1465018" y="4401122"/>
+            <a:chExt cx="952505" cy="921352"/>
+          </a:xfrm>
+        </p:grpSpPr>
+        <p:pic>
+          <p:nvPicPr>
+            <p:cNvPr id="45" name="Graphic 64">
+              <a:extLst>
+                <a:ext uri="{FF2B5EF4-FFF2-40B4-BE49-F238E27FC236}">
+                  <a16:creationId xmlns:a16="http://schemas.microsoft.com/office/drawing/2014/main" id="{B5A4F5C7-18BE-584C-8B14-9029107DF3FD}"/>
+                </a:ext>
+              </a:extLst>
+            </p:cNvPr>
+            <p:cNvPicPr>
+              <a:picLocks noChangeAspect="1" noChangeArrowheads="1"/>
+            </p:cNvPicPr>
+            <p:nvPr/>
+          </p:nvPicPr>
+          <p:blipFill>
+            <a:blip r:embed="rId9">
+              <a:extLst>
+                <a:ext uri="{28A0092B-C50C-407E-A947-70E740481C1C}">
+                  <a14:useLocalDpi xmlns:a14="http://schemas.microsoft.com/office/drawing/2010/main" val="0"/>
+                </a:ext>
+              </a:extLst>
+            </a:blip>
+            <a:srcRect/>
+            <a:stretch>
+              <a:fillRect/>
+            </a:stretch>
+          </p:blipFill>
+          <p:spPr bwMode="auto">
+            <a:xfrm>
+              <a:off x="1712671" y="4401122"/>
+              <a:ext cx="457200" cy="457200"/>
+            </a:xfrm>
+            <a:prstGeom prst="rect">
+              <a:avLst/>
+            </a:prstGeom>
+            <a:noFill/>
+            <a:ln>
+              <a:noFill/>
+            </a:ln>
+            <a:extLst>
+              <a:ext uri="{909E8E84-426E-40DD-AFC4-6F175D3DCCD1}">
+                <a14:hiddenFill xmlns:a14="http://schemas.microsoft.com/office/drawing/2010/main">
+                  <a:solidFill>
+                    <a:srgbClr val="FFFFFF"/>
+                  </a:solidFill>
+                </a14:hiddenFill>
+              </a:ext>
+              <a:ext uri="{91240B29-F687-4F45-9708-019B960494DF}">
+                <a14:hiddenLine xmlns:a14="http://schemas.microsoft.com/office/drawing/2010/main" w="9525">
+                  <a:solidFill>
+                    <a:srgbClr val="000000"/>
+                  </a:solidFill>
+                  <a:miter lim="800000"/>
+                  <a:headEnd/>
+                  <a:tailEnd/>
+                </a14:hiddenLine>
+              </a:ext>
+            </a:extLst>
+          </p:spPr>
+        </p:pic>
+        <p:sp>
+          <p:nvSpPr>
+            <p:cNvPr id="46" name="TextBox 45">
+              <a:extLst>
+                <a:ext uri="{FF2B5EF4-FFF2-40B4-BE49-F238E27FC236}">
+                  <a16:creationId xmlns:a16="http://schemas.microsoft.com/office/drawing/2014/main" id="{920A764F-5BCF-5440-97BC-FF3A7CF43717}"/>
+                </a:ext>
+              </a:extLst>
+            </p:cNvPr>
+            <p:cNvSpPr txBox="1"/>
+            <p:nvPr/>
+          </p:nvSpPr>
+          <p:spPr>
+            <a:xfrm>
+              <a:off x="1465018" y="4891587"/>
+              <a:ext cx="952505" cy="430887"/>
+            </a:xfrm>
+            <a:prstGeom prst="rect">
+              <a:avLst/>
+            </a:prstGeom>
+            <a:noFill/>
+          </p:spPr>
+          <p:txBody>
+            <a:bodyPr wrap="none" rtlCol="0">
+              <a:spAutoFit/>
+            </a:bodyPr>
+            <a:lstStyle/>
+            <a:p>
+              <a:pPr algn="ctr"/>
+              <a:r>
+                <a:rPr lang="en-US" sz="1100" dirty="0"/>
+                <a:t>Amazon S3 </a:t>
+              </a:r>
+            </a:p>
+            <a:p>
+              <a:pPr algn="ctr"/>
+              <a:r>
+                <a:rPr lang="en-US" sz="1100" dirty="0"/>
+                <a:t>Bucket</a:t>
+              </a:r>
+            </a:p>
+          </p:txBody>
+        </p:sp>
+      </p:grpSp>
+      <p:grpSp>
+        <p:nvGrpSpPr>
+          <p:cNvPr id="49" name="Group 48">
+            <a:extLst>
+              <a:ext uri="{FF2B5EF4-FFF2-40B4-BE49-F238E27FC236}">
+                <a16:creationId xmlns:a16="http://schemas.microsoft.com/office/drawing/2014/main" id="{06A754C5-F069-CD49-8CDB-1ACE3AA6D905}"/>
+              </a:ext>
+            </a:extLst>
+          </p:cNvPr>
+          <p:cNvGrpSpPr/>
+          <p:nvPr/>
+        </p:nvGrpSpPr>
+        <p:grpSpPr>
+          <a:xfrm>
+            <a:off x="8154623" y="4639400"/>
+            <a:ext cx="1166881" cy="768023"/>
+            <a:chOff x="7583612" y="4627816"/>
+            <a:chExt cx="1166881" cy="768023"/>
+          </a:xfrm>
+        </p:grpSpPr>
+        <p:sp>
+          <p:nvSpPr>
+            <p:cNvPr id="47" name="TextBox 18">
+              <a:extLst>
+                <a:ext uri="{FF2B5EF4-FFF2-40B4-BE49-F238E27FC236}">
+                  <a16:creationId xmlns:a16="http://schemas.microsoft.com/office/drawing/2014/main" id="{A216F64F-B038-1045-8805-12B78C1D11F9}"/>
+                </a:ext>
+              </a:extLst>
+            </p:cNvPr>
+            <p:cNvSpPr txBox="1">
+              <a:spLocks noChangeArrowheads="1"/>
+            </p:cNvSpPr>
+            <p:nvPr/>
+          </p:nvSpPr>
+          <p:spPr bwMode="auto">
+            <a:xfrm>
+              <a:off x="7583612" y="5134229"/>
+              <a:ext cx="1166881" cy="261610"/>
+            </a:xfrm>
+            <a:prstGeom prst="rect">
+              <a:avLst/>
+            </a:prstGeom>
+            <a:noFill/>
+            <a:ln>
+              <a:noFill/>
+            </a:ln>
+            <a:extLst>
+              <a:ext uri="{909E8E84-426E-40DD-AFC4-6F175D3DCCD1}">
+                <a14:hiddenFill xmlns:a14="http://schemas.microsoft.com/office/drawing/2010/main">
+                  <a:solidFill>
+                    <a:srgbClr val="FFFFFF"/>
+                  </a:solidFill>
+                </a14:hiddenFill>
+              </a:ext>
+              <a:ext uri="{91240B29-F687-4F45-9708-019B960494DF}">
+                <a14:hiddenLine xmlns:a14="http://schemas.microsoft.com/office/drawing/2010/main" w="9525">
+                  <a:solidFill>
+                    <a:srgbClr val="000000"/>
+                  </a:solidFill>
+                  <a:miter lim="800000"/>
+                  <a:headEnd/>
+                  <a:tailEnd/>
+                </a14:hiddenLine>
+              </a:ext>
+            </a:extLst>
+          </p:spPr>
+          <p:txBody>
+            <a:bodyPr wrap="square">
+              <a:spAutoFit/>
+            </a:bodyPr>
+            <a:lstStyle>
+              <a:lvl1pPr>
+                <a:defRPr>
+                  <a:solidFill>
+                    <a:schemeClr val="tx1"/>
+                  </a:solidFill>
+                  <a:latin typeface="Calibri" panose="020F0502020204030204" pitchFamily="34" charset="0"/>
+                </a:defRPr>
+              </a:lvl1pPr>
+              <a:lvl2pPr marL="742950" indent="-285750">
+                <a:defRPr>
+                  <a:solidFill>
+                    <a:schemeClr val="tx1"/>
+                  </a:solidFill>
+                  <a:latin typeface="Calibri" panose="020F0502020204030204" pitchFamily="34" charset="0"/>
+                </a:defRPr>
+              </a:lvl2pPr>
+              <a:lvl3pPr marL="1143000" indent="-228600">
+                <a:defRPr>
+                  <a:solidFill>
+                    <a:schemeClr val="tx1"/>
+                  </a:solidFill>
+                  <a:latin typeface="Calibri" panose="020F0502020204030204" pitchFamily="34" charset="0"/>
+                </a:defRPr>
+              </a:lvl3pPr>
+              <a:lvl4pPr marL="1600200" indent="-228600">
+                <a:defRPr>
+                  <a:solidFill>
+                    <a:schemeClr val="tx1"/>
+                  </a:solidFill>
+                  <a:latin typeface="Calibri" panose="020F0502020204030204" pitchFamily="34" charset="0"/>
+                </a:defRPr>
+              </a:lvl4pPr>
+              <a:lvl5pPr marL="2057400" indent="-228600">
+                <a:defRPr>
+                  <a:solidFill>
+                    <a:schemeClr val="tx1"/>
+                  </a:solidFill>
+                  <a:latin typeface="Calibri" panose="020F0502020204030204" pitchFamily="34" charset="0"/>
+                </a:defRPr>
+              </a:lvl5pPr>
+              <a:lvl6pPr marL="2514600" indent="-228600" eaLnBrk="0" fontAlgn="base" hangingPunct="0">
+                <a:spcBef>
+                  <a:spcPct val="0"/>
+                </a:spcBef>
+                <a:spcAft>
+                  <a:spcPct val="0"/>
+                </a:spcAft>
+                <a:defRPr>
+                  <a:solidFill>
+                    <a:schemeClr val="tx1"/>
+                  </a:solidFill>
+                  <a:latin typeface="Calibri" panose="020F0502020204030204" pitchFamily="34" charset="0"/>
+                </a:defRPr>
+              </a:lvl6pPr>
+              <a:lvl7pPr marL="2971800" indent="-228600" eaLnBrk="0" fontAlgn="base" hangingPunct="0">
+                <a:spcBef>
+                  <a:spcPct val="0"/>
+                </a:spcBef>
+                <a:spcAft>
+                  <a:spcPct val="0"/>
+                </a:spcAft>
+                <a:defRPr>
+                  <a:solidFill>
+                    <a:schemeClr val="tx1"/>
+                  </a:solidFill>
+                  <a:latin typeface="Calibri" panose="020F0502020204030204" pitchFamily="34" charset="0"/>
+                </a:defRPr>
+              </a:lvl7pPr>
+              <a:lvl8pPr marL="3429000" indent="-228600" eaLnBrk="0" fontAlgn="base" hangingPunct="0">
+                <a:spcBef>
+                  <a:spcPct val="0"/>
+                </a:spcBef>
+                <a:spcAft>
+                  <a:spcPct val="0"/>
+                </a:spcAft>
+                <a:defRPr>
+                  <a:solidFill>
+                    <a:schemeClr val="tx1"/>
+                  </a:solidFill>
+                  <a:latin typeface="Calibri" panose="020F0502020204030204" pitchFamily="34" charset="0"/>
+                </a:defRPr>
+              </a:lvl8pPr>
+              <a:lvl9pPr marL="3886200" indent="-228600" eaLnBrk="0" fontAlgn="base" hangingPunct="0">
+                <a:spcBef>
+                  <a:spcPct val="0"/>
+                </a:spcBef>
+                <a:spcAft>
+                  <a:spcPct val="0"/>
+                </a:spcAft>
+                <a:defRPr>
+                  <a:solidFill>
+                    <a:schemeClr val="tx1"/>
+                  </a:solidFill>
+                  <a:latin typeface="Calibri" panose="020F0502020204030204" pitchFamily="34" charset="0"/>
+                </a:defRPr>
+              </a:lvl9pPr>
+            </a:lstStyle>
+            <a:p>
+              <a:pPr algn="ctr" eaLnBrk="1" hangingPunct="1"/>
+              <a:r>
+                <a:rPr lang="en-US" altLang="en-US" sz="1100" dirty="0">
+                  <a:latin typeface="Arial" panose="020B0604020202020204" pitchFamily="34" charset="0"/>
+                  <a:ea typeface="Amazon Ember" panose="020B0603020204020204" pitchFamily="34" charset="0"/>
+                  <a:cs typeface="Arial" panose="020B0604020202020204" pitchFamily="34" charset="0"/>
+                </a:rPr>
+                <a:t>Data lake</a:t>
+              </a:r>
+            </a:p>
+          </p:txBody>
+        </p:sp>
+        <p:pic>
+          <p:nvPicPr>
+            <p:cNvPr id="48" name="Graphic 6">
+              <a:extLst>
+                <a:ext uri="{FF2B5EF4-FFF2-40B4-BE49-F238E27FC236}">
+                  <a16:creationId xmlns:a16="http://schemas.microsoft.com/office/drawing/2014/main" id="{61B0744B-5EB7-9748-9351-98175152A582}"/>
+                </a:ext>
+              </a:extLst>
+            </p:cNvPr>
+            <p:cNvPicPr>
+              <a:picLocks noChangeAspect="1" noChangeArrowheads="1"/>
+            </p:cNvPicPr>
+            <p:nvPr/>
+          </p:nvPicPr>
+          <p:blipFill>
+            <a:blip r:embed="rId12">
+              <a:extLst>
+                <a:ext uri="{28A0092B-C50C-407E-A947-70E740481C1C}">
+                  <a14:useLocalDpi xmlns:a14="http://schemas.microsoft.com/office/drawing/2010/main" val="0"/>
+                </a:ext>
+              </a:extLst>
+            </a:blip>
+            <a:srcRect/>
+            <a:stretch>
+              <a:fillRect/>
+            </a:stretch>
+          </p:blipFill>
+          <p:spPr bwMode="auto">
+            <a:xfrm>
+              <a:off x="7966999" y="4627816"/>
+              <a:ext cx="457200" cy="457200"/>
+            </a:xfrm>
+            <a:prstGeom prst="rect">
+              <a:avLst/>
+            </a:prstGeom>
+            <a:noFill/>
+            <a:ln>
+              <a:noFill/>
+            </a:ln>
+            <a:extLst>
+              <a:ext uri="{909E8E84-426E-40DD-AFC4-6F175D3DCCD1}">
+                <a14:hiddenFill xmlns:a14="http://schemas.microsoft.com/office/drawing/2010/main">
+                  <a:solidFill>
+                    <a:srgbClr val="FFFFFF"/>
+                  </a:solidFill>
+                </a14:hiddenFill>
+              </a:ext>
+              <a:ext uri="{91240B29-F687-4F45-9708-019B960494DF}">
+                <a14:hiddenLine xmlns:a14="http://schemas.microsoft.com/office/drawing/2010/main" w="9525">
+                  <a:solidFill>
+                    <a:srgbClr val="000000"/>
+                  </a:solidFill>
+                  <a:miter lim="800000"/>
+                  <a:headEnd/>
+                  <a:tailEnd/>
+                </a14:hiddenLine>
+              </a:ext>
+            </a:extLst>
+          </p:spPr>
+        </p:pic>
+      </p:grpSp>
+      <p:grpSp>
+        <p:nvGrpSpPr>
+          <p:cNvPr id="52" name="Group 51">
+            <a:extLst>
+              <a:ext uri="{FF2B5EF4-FFF2-40B4-BE49-F238E27FC236}">
+                <a16:creationId xmlns:a16="http://schemas.microsoft.com/office/drawing/2014/main" id="{4EFB91F2-84CD-2748-BDE5-B99775AB5EEF}"/>
+              </a:ext>
+            </a:extLst>
+          </p:cNvPr>
+          <p:cNvGrpSpPr/>
+          <p:nvPr/>
+        </p:nvGrpSpPr>
+        <p:grpSpPr>
+          <a:xfrm>
+            <a:off x="9541194" y="4640932"/>
+            <a:ext cx="1300356" cy="750626"/>
+            <a:chOff x="8974814" y="4645213"/>
+            <a:chExt cx="1300356" cy="750626"/>
+          </a:xfrm>
+        </p:grpSpPr>
+        <p:pic>
+          <p:nvPicPr>
+            <p:cNvPr id="50" name="Graphic 18">
+              <a:extLst>
+                <a:ext uri="{FF2B5EF4-FFF2-40B4-BE49-F238E27FC236}">
+                  <a16:creationId xmlns:a16="http://schemas.microsoft.com/office/drawing/2014/main" id="{3FEC52B3-0F66-7A46-B6C9-7528B626ED7B}"/>
+                </a:ext>
+              </a:extLst>
+            </p:cNvPr>
+            <p:cNvPicPr>
+              <a:picLocks noChangeAspect="1" noChangeArrowheads="1"/>
+            </p:cNvPicPr>
+            <p:nvPr/>
+          </p:nvPicPr>
+          <p:blipFill>
+            <a:blip r:embed="rId13">
+              <a:extLst>
+                <a:ext uri="{28A0092B-C50C-407E-A947-70E740481C1C}">
+                  <a14:useLocalDpi xmlns:a14="http://schemas.microsoft.com/office/drawing/2010/main" val="0"/>
+                </a:ext>
+              </a:extLst>
+            </a:blip>
+            <a:srcRect/>
+            <a:stretch>
+              <a:fillRect/>
+            </a:stretch>
+          </p:blipFill>
+          <p:spPr bwMode="auto">
+            <a:xfrm>
+              <a:off x="9310080" y="4645213"/>
+              <a:ext cx="491239" cy="491239"/>
+            </a:xfrm>
+            <a:prstGeom prst="rect">
+              <a:avLst/>
+            </a:prstGeom>
+            <a:noFill/>
+            <a:ln>
+              <a:noFill/>
+            </a:ln>
+            <a:extLst>
+              <a:ext uri="{909E8E84-426E-40DD-AFC4-6F175D3DCCD1}">
+                <a14:hiddenFill xmlns:a14="http://schemas.microsoft.com/office/drawing/2010/main">
+                  <a:solidFill>
+                    <a:srgbClr val="FFFFFF"/>
+                  </a:solidFill>
+                </a14:hiddenFill>
+              </a:ext>
+              <a:ext uri="{91240B29-F687-4F45-9708-019B960494DF}">
+                <a14:hiddenLine xmlns:a14="http://schemas.microsoft.com/office/drawing/2010/main" w="9525">
+                  <a:solidFill>
+                    <a:srgbClr val="000000"/>
+                  </a:solidFill>
+                  <a:miter lim="800000"/>
+                  <a:headEnd/>
+                  <a:tailEnd/>
+                </a14:hiddenLine>
+              </a:ext>
+            </a:extLst>
+          </p:spPr>
+        </p:pic>
+        <p:sp>
+          <p:nvSpPr>
+            <p:cNvPr id="51" name="TextBox 50">
+              <a:extLst>
+                <a:ext uri="{FF2B5EF4-FFF2-40B4-BE49-F238E27FC236}">
+                  <a16:creationId xmlns:a16="http://schemas.microsoft.com/office/drawing/2014/main" id="{83BEEBC0-5F73-D641-9B8C-4803DB66AAE7}"/>
+                </a:ext>
+              </a:extLst>
+            </p:cNvPr>
+            <p:cNvSpPr txBox="1"/>
+            <p:nvPr/>
+          </p:nvSpPr>
+          <p:spPr>
+            <a:xfrm>
+              <a:off x="8974814" y="5134229"/>
+              <a:ext cx="1300356" cy="261610"/>
+            </a:xfrm>
+            <a:prstGeom prst="rect">
+              <a:avLst/>
+            </a:prstGeom>
+            <a:noFill/>
+          </p:spPr>
+          <p:txBody>
+            <a:bodyPr wrap="none" rtlCol="0">
+              <a:spAutoFit/>
+            </a:bodyPr>
+            <a:lstStyle/>
+            <a:p>
+              <a:r>
+                <a:rPr lang="en-US" sz="1100" dirty="0"/>
+                <a:t>Analytics Solution</a:t>
+              </a:r>
+            </a:p>
+          </p:txBody>
+        </p:sp>
+      </p:grpSp>
+      <p:cxnSp>
+        <p:nvCxnSpPr>
+          <p:cNvPr id="56" name="Elbow Connector 55">
+            <a:extLst>
+              <a:ext uri="{FF2B5EF4-FFF2-40B4-BE49-F238E27FC236}">
+                <a16:creationId xmlns:a16="http://schemas.microsoft.com/office/drawing/2014/main" id="{AA1905B4-54AC-9141-B940-3CFD850152D8}"/>
+              </a:ext>
+            </a:extLst>
+          </p:cNvPr>
+          <p:cNvCxnSpPr>
             <a:stCxn id="34" idx="1"/>
             <a:endCxn id="9" idx="1"/>
           </p:cNvCxnSpPr>
@@ -11716,11 +14596,11 @@
         <p:spPr>
           <a:xfrm>
             <a:off x="9247738" y="3105979"/>
-            <a:ext cx="1714211" cy="1930479"/>
+            <a:ext cx="1674258" cy="1941260"/>
           </a:xfrm>
           <a:prstGeom prst="bentConnector3">
             <a:avLst>
-              <a:gd name="adj1" fmla="val 113336"/>
+              <a:gd name="adj1" fmla="val 113654"/>
             </a:avLst>
           </a:prstGeom>
           <a:ln>
@@ -11828,10 +14708,186 @@
           </a:fontRef>
         </p:style>
       </p:cxnSp>
+      <p:sp>
+        <p:nvSpPr>
+          <p:cNvPr id="53" name="Rectangle 52">
+            <a:extLst>
+              <a:ext uri="{FF2B5EF4-FFF2-40B4-BE49-F238E27FC236}">
+                <a16:creationId xmlns:a16="http://schemas.microsoft.com/office/drawing/2014/main" id="{2923F02B-F3F7-1F40-AEC0-917366509B03}"/>
+              </a:ext>
+            </a:extLst>
+          </p:cNvPr>
+          <p:cNvSpPr/>
+          <p:nvPr/>
+        </p:nvSpPr>
+        <p:spPr>
+          <a:xfrm>
+            <a:off x="5081178" y="1407511"/>
+            <a:ext cx="2095500" cy="896286"/>
+          </a:xfrm>
+          <a:prstGeom prst="rect">
+            <a:avLst/>
+          </a:prstGeom>
+          <a:noFill/>
+          <a:ln w="12700">
+            <a:solidFill>
+              <a:srgbClr val="D86613"/>
+            </a:solidFill>
+            <a:prstDash val="dash"/>
+          </a:ln>
+        </p:spPr>
+        <p:style>
+          <a:lnRef idx="2">
+            <a:schemeClr val="accent1">
+              <a:shade val="50000"/>
+            </a:schemeClr>
+          </a:lnRef>
+          <a:fillRef idx="1">
+            <a:schemeClr val="accent1"/>
+          </a:fillRef>
+          <a:effectRef idx="0">
+            <a:schemeClr val="accent1"/>
+          </a:effectRef>
+          <a:fontRef idx="minor">
+            <a:schemeClr val="lt1"/>
+          </a:fontRef>
+        </p:style>
+        <p:txBody>
+          <a:bodyPr tIns="91440"/>
+          <a:lstStyle/>
+          <a:p>
+            <a:pPr algn="ctr" eaLnBrk="1" fontAlgn="auto" hangingPunct="1">
+              <a:spcBef>
+                <a:spcPts val="0"/>
+              </a:spcBef>
+              <a:spcAft>
+                <a:spcPts val="0"/>
+              </a:spcAft>
+              <a:defRPr/>
+            </a:pPr>
+            <a:r>
+              <a:rPr lang="en-US" sz="1100" dirty="0">
+                <a:solidFill>
+                  <a:srgbClr val="D86613"/>
+                </a:solidFill>
+                <a:latin typeface="Arial" panose="020B0604020202020204" pitchFamily="34" charset="0"/>
+                <a:cs typeface="Arial" panose="020B0604020202020204" pitchFamily="34" charset="0"/>
+              </a:rPr>
+              <a:t>Cribl Cloud LogStream Leader</a:t>
+            </a:r>
+          </a:p>
+        </p:txBody>
+      </p:sp>
+      <p:sp>
+        <p:nvSpPr>
+          <p:cNvPr id="54" name="Rectangle 53">
+            <a:extLst>
+              <a:ext uri="{FF2B5EF4-FFF2-40B4-BE49-F238E27FC236}">
+                <a16:creationId xmlns:a16="http://schemas.microsoft.com/office/drawing/2014/main" id="{28D01F34-8658-274D-B057-773FA0938A1A}"/>
+              </a:ext>
+            </a:extLst>
+          </p:cNvPr>
+          <p:cNvSpPr/>
+          <p:nvPr/>
+        </p:nvSpPr>
+        <p:spPr bwMode="auto">
+          <a:xfrm>
+            <a:off x="909431" y="1390219"/>
+            <a:ext cx="10371550" cy="931456"/>
+          </a:xfrm>
+          <a:prstGeom prst="rect">
+            <a:avLst/>
+          </a:prstGeom>
+          <a:noFill/>
+          <a:ln w="12700">
+            <a:solidFill>
+              <a:srgbClr val="1E8900"/>
+            </a:solidFill>
+          </a:ln>
+        </p:spPr>
+        <p:style>
+          <a:lnRef idx="2">
+            <a:schemeClr val="accent1">
+              <a:shade val="50000"/>
+            </a:schemeClr>
+          </a:lnRef>
+          <a:fillRef idx="1">
+            <a:schemeClr val="accent1"/>
+          </a:fillRef>
+          <a:effectRef idx="0">
+            <a:schemeClr val="accent1"/>
+          </a:effectRef>
+          <a:fontRef idx="minor">
+            <a:schemeClr val="lt1"/>
+          </a:fontRef>
+        </p:style>
+        <p:txBody>
+          <a:bodyPr lIns="502920" tIns="91440"/>
+          <a:lstStyle/>
+          <a:p>
+            <a:pPr eaLnBrk="1" fontAlgn="auto" hangingPunct="1">
+              <a:spcBef>
+                <a:spcPts val="0"/>
+              </a:spcBef>
+              <a:spcAft>
+                <a:spcPts val="0"/>
+              </a:spcAft>
+              <a:defRPr/>
+            </a:pPr>
+            <a:r>
+              <a:rPr lang="en-US" sz="1200" dirty="0">
+                <a:ln w="0"/>
+                <a:solidFill>
+                  <a:srgbClr val="1E8900"/>
+                </a:solidFill>
+                <a:latin typeface="Arial" panose="020B0604020202020204" pitchFamily="34" charset="0"/>
+                <a:cs typeface="Arial" panose="020B0604020202020204" pitchFamily="34" charset="0"/>
+              </a:rPr>
+              <a:t>VPC</a:t>
+            </a:r>
+          </a:p>
+        </p:txBody>
+      </p:sp>
+      <p:pic>
+        <p:nvPicPr>
+          <p:cNvPr id="55" name="Graphic 54">
+            <a:extLst>
+              <a:ext uri="{FF2B5EF4-FFF2-40B4-BE49-F238E27FC236}">
+                <a16:creationId xmlns:a16="http://schemas.microsoft.com/office/drawing/2014/main" id="{64A402A8-5EF5-1B4D-93F8-FDC0EDF22A33}"/>
+              </a:ext>
+            </a:extLst>
+          </p:cNvPr>
+          <p:cNvPicPr>
+            <a:picLocks noChangeAspect="1"/>
+          </p:cNvPicPr>
+          <p:nvPr/>
+        </p:nvPicPr>
+        <p:blipFill>
+          <a:blip r:embed="rId5">
+            <a:extLst>
+              <a:ext uri="{96DAC541-7B7A-43D3-8B79-37D633B846F1}">
+                <asvg:svgBlip xmlns:asvg="http://schemas.microsoft.com/office/drawing/2016/SVG/main" r:embed="rId6"/>
+              </a:ext>
+            </a:extLst>
+          </a:blip>
+          <a:stretch>
+            <a:fillRect/>
+          </a:stretch>
+        </p:blipFill>
+        <p:spPr>
+          <a:xfrm>
+            <a:off x="912002" y="1390220"/>
+            <a:ext cx="381000" cy="381000"/>
+          </a:xfrm>
+          <a:prstGeom prst="rect">
+            <a:avLst/>
+          </a:prstGeom>
+        </p:spPr>
+      </p:pic>
     </p:spTree>
     <p:extLst>
       <p:ext uri="{BB962C8B-B14F-4D97-AF65-F5344CB8AC3E}">
-        <p14:creationId xmlns:p14="http://schemas.microsoft.com/office/powerpoint/2010/main" val="512673369"/>
+        <p14:creationId xmlns:p14="http://schemas.microsoft.com/office/powerpoint/2010/main" val="3867176793"/>
       </p:ext>
     </p:extLst>
   </p:cSld>
@@ -11841,7 +14897,7 @@
 </p:sld>
 </file>
 
-<file path=ppt/slides/slide3.xml><?xml version="1.0" encoding="utf-8"?>
+<file path=ppt/slides/slide4.xml><?xml version="1.0" encoding="utf-8"?>
 <p:sld xmlns:a="http://schemas.openxmlformats.org/drawingml/2006/main" xmlns:r="http://schemas.openxmlformats.org/officeDocument/2006/relationships" xmlns:p="http://schemas.openxmlformats.org/presentationml/2006/main">
   <p:cSld>
     <p:spTree>
@@ -12039,8 +15095,8 @@
         </p:nvSpPr>
         <p:spPr bwMode="auto">
           <a:xfrm>
-            <a:off x="5048250" y="2226340"/>
-            <a:ext cx="2095500" cy="1500810"/>
+            <a:off x="5048250" y="2683565"/>
+            <a:ext cx="2095500" cy="1530602"/>
           </a:xfrm>
           <a:prstGeom prst="rect">
             <a:avLst/>
@@ -12124,7 +15180,7 @@
         </p:blipFill>
         <p:spPr bwMode="auto">
           <a:xfrm>
-            <a:off x="5861050" y="2717198"/>
+            <a:off x="5861050" y="3204215"/>
             <a:ext cx="469900" cy="469900"/>
           </a:xfrm>
           <a:prstGeom prst="rect">
@@ -12171,7 +15227,7 @@
         </p:nvSpPr>
         <p:spPr bwMode="auto">
           <a:xfrm>
-            <a:off x="5211823" y="3162568"/>
+            <a:off x="5211823" y="3649585"/>
             <a:ext cx="1767152" cy="261610"/>
           </a:xfrm>
           <a:prstGeom prst="rect">
@@ -13525,6 +16581,7 @@
             </a:extLst>
           </p:cNvPr>
           <p:cNvCxnSpPr>
+            <a:cxnSpLocks/>
             <a:stCxn id="34" idx="1"/>
             <a:endCxn id="9" idx="1"/>
           </p:cNvCxnSpPr>
@@ -13532,8 +16589,8 @@
         </p:nvCxnSpPr>
         <p:spPr>
           <a:xfrm rot="10800000" flipH="1">
-            <a:off x="1270006" y="2976746"/>
-            <a:ext cx="3778244" cy="2059713"/>
+            <a:off x="1270006" y="3448866"/>
+            <a:ext cx="3778244" cy="1587592"/>
           </a:xfrm>
           <a:prstGeom prst="bentConnector3">
             <a:avLst>
@@ -13578,8 +16635,8 @@
         </p:nvCxnSpPr>
         <p:spPr>
           <a:xfrm>
-            <a:off x="7143750" y="2976745"/>
-            <a:ext cx="3818199" cy="2059713"/>
+            <a:off x="7143750" y="3448866"/>
+            <a:ext cx="3818199" cy="1587592"/>
           </a:xfrm>
           <a:prstGeom prst="bentConnector3">
             <a:avLst>
@@ -13605,6 +16662,618 @@
           </a:fontRef>
         </p:style>
       </p:cxnSp>
+      <p:sp>
+        <p:nvSpPr>
+          <p:cNvPr id="53" name="Rectangle 52">
+            <a:extLst>
+              <a:ext uri="{FF2B5EF4-FFF2-40B4-BE49-F238E27FC236}">
+                <a16:creationId xmlns:a16="http://schemas.microsoft.com/office/drawing/2014/main" id="{F725E55C-DC76-004D-973E-52FCD8ED796E}"/>
+              </a:ext>
+            </a:extLst>
+          </p:cNvPr>
+          <p:cNvSpPr/>
+          <p:nvPr/>
+        </p:nvSpPr>
+        <p:spPr>
+          <a:xfrm>
+            <a:off x="5211630" y="3031605"/>
+            <a:ext cx="1767152" cy="1106488"/>
+          </a:xfrm>
+          <a:prstGeom prst="rect">
+            <a:avLst/>
+          </a:prstGeom>
+          <a:noFill/>
+          <a:ln w="12700">
+            <a:solidFill>
+              <a:srgbClr val="D86613"/>
+            </a:solidFill>
+            <a:prstDash val="dash"/>
+          </a:ln>
+        </p:spPr>
+        <p:style>
+          <a:lnRef idx="2">
+            <a:schemeClr val="accent1">
+              <a:shade val="50000"/>
+            </a:schemeClr>
+          </a:lnRef>
+          <a:fillRef idx="1">
+            <a:schemeClr val="accent1"/>
+          </a:fillRef>
+          <a:effectRef idx="0">
+            <a:schemeClr val="accent1"/>
+          </a:effectRef>
+          <a:fontRef idx="minor">
+            <a:schemeClr val="lt1"/>
+          </a:fontRef>
+        </p:style>
+        <p:txBody>
+          <a:bodyPr tIns="91440"/>
+          <a:lstStyle/>
+          <a:p>
+            <a:pPr algn="ctr" eaLnBrk="1" fontAlgn="auto" hangingPunct="1">
+              <a:spcBef>
+                <a:spcPts val="0"/>
+              </a:spcBef>
+              <a:spcAft>
+                <a:spcPts val="0"/>
+              </a:spcAft>
+              <a:defRPr/>
+            </a:pPr>
+            <a:endParaRPr lang="en-US" sz="1200" dirty="0">
+              <a:solidFill>
+                <a:srgbClr val="D86613"/>
+              </a:solidFill>
+              <a:latin typeface="Arial" panose="020B0604020202020204" pitchFamily="34" charset="0"/>
+              <a:cs typeface="Arial" panose="020B0604020202020204" pitchFamily="34" charset="0"/>
+            </a:endParaRPr>
+          </a:p>
+          <a:p>
+            <a:pPr algn="ctr" eaLnBrk="1" fontAlgn="auto" hangingPunct="1">
+              <a:spcBef>
+                <a:spcPts val="0"/>
+              </a:spcBef>
+              <a:spcAft>
+                <a:spcPts val="0"/>
+              </a:spcAft>
+              <a:defRPr/>
+            </a:pPr>
+            <a:endParaRPr lang="en-US" sz="1200" dirty="0">
+              <a:solidFill>
+                <a:srgbClr val="D86613"/>
+              </a:solidFill>
+              <a:latin typeface="Arial" panose="020B0604020202020204" pitchFamily="34" charset="0"/>
+              <a:cs typeface="Arial" panose="020B0604020202020204" pitchFamily="34" charset="0"/>
+            </a:endParaRPr>
+          </a:p>
+          <a:p>
+            <a:pPr algn="ctr" eaLnBrk="1" fontAlgn="auto" hangingPunct="1">
+              <a:spcBef>
+                <a:spcPts val="0"/>
+              </a:spcBef>
+              <a:spcAft>
+                <a:spcPts val="0"/>
+              </a:spcAft>
+              <a:defRPr/>
+            </a:pPr>
+            <a:endParaRPr lang="en-US" sz="1200" dirty="0">
+              <a:solidFill>
+                <a:srgbClr val="D86613"/>
+              </a:solidFill>
+              <a:latin typeface="Arial" panose="020B0604020202020204" pitchFamily="34" charset="0"/>
+              <a:cs typeface="Arial" panose="020B0604020202020204" pitchFamily="34" charset="0"/>
+            </a:endParaRPr>
+          </a:p>
+          <a:p>
+            <a:pPr algn="ctr" eaLnBrk="1" fontAlgn="auto" hangingPunct="1">
+              <a:spcBef>
+                <a:spcPts val="0"/>
+              </a:spcBef>
+              <a:spcAft>
+                <a:spcPts val="0"/>
+              </a:spcAft>
+              <a:defRPr/>
+            </a:pPr>
+            <a:endParaRPr lang="en-US" sz="1200" dirty="0">
+              <a:solidFill>
+                <a:srgbClr val="D86613"/>
+              </a:solidFill>
+              <a:latin typeface="Arial" panose="020B0604020202020204" pitchFamily="34" charset="0"/>
+              <a:cs typeface="Arial" panose="020B0604020202020204" pitchFamily="34" charset="0"/>
+            </a:endParaRPr>
+          </a:p>
+          <a:p>
+            <a:pPr algn="ctr" eaLnBrk="1" fontAlgn="auto" hangingPunct="1">
+              <a:spcBef>
+                <a:spcPts val="0"/>
+              </a:spcBef>
+              <a:spcAft>
+                <a:spcPts val="0"/>
+              </a:spcAft>
+              <a:defRPr/>
+            </a:pPr>
+            <a:r>
+              <a:rPr lang="en-US" sz="1200" dirty="0">
+                <a:solidFill>
+                  <a:srgbClr val="D86613"/>
+                </a:solidFill>
+                <a:latin typeface="Arial" panose="020B0604020202020204" pitchFamily="34" charset="0"/>
+                <a:cs typeface="Arial" panose="020B0604020202020204" pitchFamily="34" charset="0"/>
+              </a:rPr>
+              <a:t>Auto Scaling group</a:t>
+            </a:r>
+          </a:p>
+        </p:txBody>
+      </p:sp>
+      <p:grpSp>
+        <p:nvGrpSpPr>
+          <p:cNvPr id="3" name="Group 2">
+            <a:extLst>
+              <a:ext uri="{FF2B5EF4-FFF2-40B4-BE49-F238E27FC236}">
+                <a16:creationId xmlns:a16="http://schemas.microsoft.com/office/drawing/2014/main" id="{F2582E4A-6E83-A844-84FE-A74CF19D9D48}"/>
+              </a:ext>
+            </a:extLst>
+          </p:cNvPr>
+          <p:cNvGrpSpPr/>
+          <p:nvPr/>
+        </p:nvGrpSpPr>
+        <p:grpSpPr>
+          <a:xfrm>
+            <a:off x="3821723" y="1539020"/>
+            <a:ext cx="2941367" cy="1144545"/>
+            <a:chOff x="3821723" y="1539020"/>
+            <a:chExt cx="2941367" cy="1144545"/>
+          </a:xfrm>
+        </p:grpSpPr>
+        <p:grpSp>
+          <p:nvGrpSpPr>
+            <p:cNvPr id="10" name="Group 9">
+              <a:extLst>
+                <a:ext uri="{FF2B5EF4-FFF2-40B4-BE49-F238E27FC236}">
+                  <a16:creationId xmlns:a16="http://schemas.microsoft.com/office/drawing/2014/main" id="{A176597A-6FCC-7D47-A6C0-B2DC347B52D7}"/>
+                </a:ext>
+              </a:extLst>
+            </p:cNvPr>
+            <p:cNvGrpSpPr/>
+            <p:nvPr/>
+          </p:nvGrpSpPr>
+          <p:grpSpPr>
+            <a:xfrm>
+              <a:off x="5423240" y="1539020"/>
+              <a:ext cx="1339850" cy="905549"/>
+              <a:chOff x="6865178" y="2805113"/>
+              <a:chExt cx="1339850" cy="905549"/>
+            </a:xfrm>
+          </p:grpSpPr>
+          <p:sp>
+            <p:nvSpPr>
+              <p:cNvPr id="55" name="TextBox 19">
+                <a:extLst>
+                  <a:ext uri="{FF2B5EF4-FFF2-40B4-BE49-F238E27FC236}">
+                    <a16:creationId xmlns:a16="http://schemas.microsoft.com/office/drawing/2014/main" id="{7326EA55-2CAB-A742-93ED-43C7CF99BFDE}"/>
+                  </a:ext>
+                </a:extLst>
+              </p:cNvPr>
+              <p:cNvSpPr txBox="1">
+                <a:spLocks noChangeArrowheads="1"/>
+              </p:cNvSpPr>
+              <p:nvPr/>
+            </p:nvSpPr>
+            <p:spPr bwMode="auto">
+              <a:xfrm>
+                <a:off x="6865178" y="3279775"/>
+                <a:ext cx="1339850" cy="430887"/>
+              </a:xfrm>
+              <a:prstGeom prst="rect">
+                <a:avLst/>
+              </a:prstGeom>
+              <a:noFill/>
+              <a:ln>
+                <a:noFill/>
+              </a:ln>
+              <a:extLst>
+                <a:ext uri="{909E8E84-426E-40DD-AFC4-6F175D3DCCD1}">
+                  <a14:hiddenFill xmlns:a14="http://schemas.microsoft.com/office/drawing/2010/main">
+                    <a:solidFill>
+                      <a:srgbClr val="FFFFFF"/>
+                    </a:solidFill>
+                  </a14:hiddenFill>
+                </a:ext>
+                <a:ext uri="{91240B29-F687-4F45-9708-019B960494DF}">
+                  <a14:hiddenLine xmlns:a14="http://schemas.microsoft.com/office/drawing/2010/main" w="9525">
+                    <a:solidFill>
+                      <a:srgbClr val="000000"/>
+                    </a:solidFill>
+                    <a:miter lim="800000"/>
+                    <a:headEnd/>
+                    <a:tailEnd/>
+                  </a14:hiddenLine>
+                </a:ext>
+              </a:extLst>
+            </p:spPr>
+            <p:txBody>
+              <a:bodyPr wrap="square">
+                <a:spAutoFit/>
+              </a:bodyPr>
+              <a:lstStyle>
+                <a:lvl1pPr>
+                  <a:defRPr>
+                    <a:solidFill>
+                      <a:schemeClr val="tx1"/>
+                    </a:solidFill>
+                    <a:latin typeface="Calibri" panose="020F0502020204030204" pitchFamily="34" charset="0"/>
+                  </a:defRPr>
+                </a:lvl1pPr>
+                <a:lvl2pPr marL="742950" indent="-285750">
+                  <a:defRPr>
+                    <a:solidFill>
+                      <a:schemeClr val="tx1"/>
+                    </a:solidFill>
+                    <a:latin typeface="Calibri" panose="020F0502020204030204" pitchFamily="34" charset="0"/>
+                  </a:defRPr>
+                </a:lvl2pPr>
+                <a:lvl3pPr marL="1143000" indent="-228600">
+                  <a:defRPr>
+                    <a:solidFill>
+                      <a:schemeClr val="tx1"/>
+                    </a:solidFill>
+                    <a:latin typeface="Calibri" panose="020F0502020204030204" pitchFamily="34" charset="0"/>
+                  </a:defRPr>
+                </a:lvl3pPr>
+                <a:lvl4pPr marL="1600200" indent="-228600">
+                  <a:defRPr>
+                    <a:solidFill>
+                      <a:schemeClr val="tx1"/>
+                    </a:solidFill>
+                    <a:latin typeface="Calibri" panose="020F0502020204030204" pitchFamily="34" charset="0"/>
+                  </a:defRPr>
+                </a:lvl4pPr>
+                <a:lvl5pPr marL="2057400" indent="-228600">
+                  <a:defRPr>
+                    <a:solidFill>
+                      <a:schemeClr val="tx1"/>
+                    </a:solidFill>
+                    <a:latin typeface="Calibri" panose="020F0502020204030204" pitchFamily="34" charset="0"/>
+                  </a:defRPr>
+                </a:lvl5pPr>
+                <a:lvl6pPr marL="2514600" indent="-228600" eaLnBrk="0" fontAlgn="base" hangingPunct="0">
+                  <a:spcBef>
+                    <a:spcPct val="0"/>
+                  </a:spcBef>
+                  <a:spcAft>
+                    <a:spcPct val="0"/>
+                  </a:spcAft>
+                  <a:defRPr>
+                    <a:solidFill>
+                      <a:schemeClr val="tx1"/>
+                    </a:solidFill>
+                    <a:latin typeface="Calibri" panose="020F0502020204030204" pitchFamily="34" charset="0"/>
+                  </a:defRPr>
+                </a:lvl6pPr>
+                <a:lvl7pPr marL="2971800" indent="-228600" eaLnBrk="0" fontAlgn="base" hangingPunct="0">
+                  <a:spcBef>
+                    <a:spcPct val="0"/>
+                  </a:spcBef>
+                  <a:spcAft>
+                    <a:spcPct val="0"/>
+                  </a:spcAft>
+                  <a:defRPr>
+                    <a:solidFill>
+                      <a:schemeClr val="tx1"/>
+                    </a:solidFill>
+                    <a:latin typeface="Calibri" panose="020F0502020204030204" pitchFamily="34" charset="0"/>
+                  </a:defRPr>
+                </a:lvl7pPr>
+                <a:lvl8pPr marL="3429000" indent="-228600" eaLnBrk="0" fontAlgn="base" hangingPunct="0">
+                  <a:spcBef>
+                    <a:spcPct val="0"/>
+                  </a:spcBef>
+                  <a:spcAft>
+                    <a:spcPct val="0"/>
+                  </a:spcAft>
+                  <a:defRPr>
+                    <a:solidFill>
+                      <a:schemeClr val="tx1"/>
+                    </a:solidFill>
+                    <a:latin typeface="Calibri" panose="020F0502020204030204" pitchFamily="34" charset="0"/>
+                  </a:defRPr>
+                </a:lvl8pPr>
+                <a:lvl9pPr marL="3886200" indent="-228600" eaLnBrk="0" fontAlgn="base" hangingPunct="0">
+                  <a:spcBef>
+                    <a:spcPct val="0"/>
+                  </a:spcBef>
+                  <a:spcAft>
+                    <a:spcPct val="0"/>
+                  </a:spcAft>
+                  <a:defRPr>
+                    <a:solidFill>
+                      <a:schemeClr val="tx1"/>
+                    </a:solidFill>
+                    <a:latin typeface="Calibri" panose="020F0502020204030204" pitchFamily="34" charset="0"/>
+                  </a:defRPr>
+                </a:lvl9pPr>
+              </a:lstStyle>
+              <a:p>
+                <a:pPr algn="ctr" eaLnBrk="1" hangingPunct="1"/>
+                <a:r>
+                  <a:rPr lang="en-US" altLang="en-US" sz="1100" dirty="0">
+                    <a:latin typeface="Arial" panose="020B0604020202020204" pitchFamily="34" charset="0"/>
+                    <a:ea typeface="Amazon Ember" panose="020B0603020204020204" pitchFamily="34" charset="0"/>
+                    <a:cs typeface="Arial" panose="020B0604020202020204" pitchFamily="34" charset="0"/>
+                  </a:rPr>
+                  <a:t>Application Load </a:t>
+                </a:r>
+                <a:br>
+                  <a:rPr lang="en-US" altLang="en-US" sz="1100" dirty="0">
+                    <a:latin typeface="Arial" panose="020B0604020202020204" pitchFamily="34" charset="0"/>
+                    <a:ea typeface="Amazon Ember" panose="020B0603020204020204" pitchFamily="34" charset="0"/>
+                    <a:cs typeface="Arial" panose="020B0604020202020204" pitchFamily="34" charset="0"/>
+                  </a:rPr>
+                </a:br>
+                <a:r>
+                  <a:rPr lang="en-US" altLang="en-US" sz="1100" dirty="0">
+                    <a:latin typeface="Arial" panose="020B0604020202020204" pitchFamily="34" charset="0"/>
+                    <a:ea typeface="Amazon Ember" panose="020B0603020204020204" pitchFamily="34" charset="0"/>
+                    <a:cs typeface="Arial" panose="020B0604020202020204" pitchFamily="34" charset="0"/>
+                  </a:rPr>
+                  <a:t>Balancer</a:t>
+                </a:r>
+              </a:p>
+            </p:txBody>
+          </p:sp>
+          <p:pic>
+            <p:nvPicPr>
+              <p:cNvPr id="57" name="Graphic 8">
+                <a:extLst>
+                  <a:ext uri="{FF2B5EF4-FFF2-40B4-BE49-F238E27FC236}">
+                    <a16:creationId xmlns:a16="http://schemas.microsoft.com/office/drawing/2014/main" id="{7E439D0A-1295-F04A-ADF5-EFDBEAF7B4CB}"/>
+                  </a:ext>
+                </a:extLst>
+              </p:cNvPr>
+              <p:cNvPicPr>
+                <a:picLocks noChangeAspect="1" noChangeArrowheads="1"/>
+              </p:cNvPicPr>
+              <p:nvPr/>
+            </p:nvPicPr>
+            <p:blipFill>
+              <a:blip r:embed="rId12">
+                <a:extLst>
+                  <a:ext uri="{28A0092B-C50C-407E-A947-70E740481C1C}">
+                    <a14:useLocalDpi xmlns:a14="http://schemas.microsoft.com/office/drawing/2010/main" val="0"/>
+                  </a:ext>
+                </a:extLst>
+              </a:blip>
+              <a:srcRect/>
+              <a:stretch>
+                <a:fillRect/>
+              </a:stretch>
+            </p:blipFill>
+            <p:spPr bwMode="auto">
+              <a:xfrm>
+                <a:off x="7302500" y="2805113"/>
+                <a:ext cx="457200" cy="457200"/>
+              </a:xfrm>
+              <a:prstGeom prst="rect">
+                <a:avLst/>
+              </a:prstGeom>
+              <a:noFill/>
+              <a:ln>
+                <a:noFill/>
+              </a:ln>
+              <a:extLst>
+                <a:ext uri="{909E8E84-426E-40DD-AFC4-6F175D3DCCD1}">
+                  <a14:hiddenFill xmlns:a14="http://schemas.microsoft.com/office/drawing/2010/main">
+                    <a:solidFill>
+                      <a:srgbClr val="FFFFFF"/>
+                    </a:solidFill>
+                  </a14:hiddenFill>
+                </a:ext>
+                <a:ext uri="{91240B29-F687-4F45-9708-019B960494DF}">
+                  <a14:hiddenLine xmlns:a14="http://schemas.microsoft.com/office/drawing/2010/main" w="9525">
+                    <a:solidFill>
+                      <a:srgbClr val="000000"/>
+                    </a:solidFill>
+                    <a:miter lim="800000"/>
+                    <a:headEnd/>
+                    <a:tailEnd/>
+                  </a14:hiddenLine>
+                </a:ext>
+              </a:extLst>
+            </p:spPr>
+          </p:pic>
+        </p:grpSp>
+        <p:pic>
+          <p:nvPicPr>
+            <p:cNvPr id="59" name="Graphic 6">
+              <a:extLst>
+                <a:ext uri="{FF2B5EF4-FFF2-40B4-BE49-F238E27FC236}">
+                  <a16:creationId xmlns:a16="http://schemas.microsoft.com/office/drawing/2014/main" id="{CB729728-5AA5-2540-8851-8563280BAD8C}"/>
+                </a:ext>
+              </a:extLst>
+            </p:cNvPr>
+            <p:cNvPicPr>
+              <a:picLocks noChangeAspect="1" noChangeArrowheads="1"/>
+            </p:cNvPicPr>
+            <p:nvPr/>
+          </p:nvPicPr>
+          <p:blipFill>
+            <a:blip r:embed="rId13">
+              <a:extLst>
+                <a:ext uri="{96DAC541-7B7A-43D3-8B79-37D633B846F1}">
+                  <asvg:svgBlip xmlns:asvg="http://schemas.microsoft.com/office/drawing/2016/SVG/main" r:embed="rId14"/>
+                </a:ext>
+              </a:extLst>
+            </a:blip>
+            <a:srcRect/>
+            <a:stretch/>
+          </p:blipFill>
+          <p:spPr bwMode="auto">
+            <a:xfrm flipH="1">
+              <a:off x="4066748" y="1554772"/>
+              <a:ext cx="469900" cy="469900"/>
+            </a:xfrm>
+            <a:prstGeom prst="rect">
+              <a:avLst/>
+            </a:prstGeom>
+            <a:noFill/>
+            <a:ln>
+              <a:noFill/>
+            </a:ln>
+            <a:extLst>
+              <a:ext uri="{909E8E84-426E-40DD-AFC4-6F175D3DCCD1}">
+                <a14:hiddenFill xmlns:a14="http://schemas.microsoft.com/office/drawing/2010/main">
+                  <a:solidFill>
+                    <a:srgbClr val="FFFFFF"/>
+                  </a:solidFill>
+                </a14:hiddenFill>
+              </a:ext>
+              <a:ext uri="{91240B29-F687-4F45-9708-019B960494DF}">
+                <a14:hiddenLine xmlns:a14="http://schemas.microsoft.com/office/drawing/2010/main" w="9525">
+                  <a:solidFill>
+                    <a:srgbClr val="000000"/>
+                  </a:solidFill>
+                  <a:miter lim="800000"/>
+                  <a:headEnd/>
+                  <a:tailEnd/>
+                </a14:hiddenLine>
+              </a:ext>
+            </a:extLst>
+          </p:spPr>
+        </p:pic>
+        <p:cxnSp>
+          <p:nvCxnSpPr>
+            <p:cNvPr id="60" name="Straight Arrow Connector 59">
+              <a:extLst>
+                <a:ext uri="{FF2B5EF4-FFF2-40B4-BE49-F238E27FC236}">
+                  <a16:creationId xmlns:a16="http://schemas.microsoft.com/office/drawing/2014/main" id="{7DD54C9D-6F6F-9440-843F-BC81E3DB9CE3}"/>
+                </a:ext>
+              </a:extLst>
+            </p:cNvPr>
+            <p:cNvCxnSpPr>
+              <a:cxnSpLocks/>
+            </p:cNvCxnSpPr>
+            <p:nvPr/>
+          </p:nvCxnSpPr>
+          <p:spPr>
+            <a:xfrm>
+              <a:off x="4670792" y="1853222"/>
+              <a:ext cx="1046162" cy="0"/>
+            </a:xfrm>
+            <a:prstGeom prst="straightConnector1">
+              <a:avLst/>
+            </a:prstGeom>
+            <a:ln w="12700">
+              <a:solidFill>
+                <a:schemeClr val="tx2"/>
+              </a:solidFill>
+              <a:headEnd type="none" w="med" len="sm"/>
+              <a:tailEnd type="arrow" w="med" len="sm"/>
+            </a:ln>
+          </p:spPr>
+          <p:style>
+            <a:lnRef idx="1">
+              <a:schemeClr val="accent1"/>
+            </a:lnRef>
+            <a:fillRef idx="0">
+              <a:schemeClr val="accent1"/>
+            </a:fillRef>
+            <a:effectRef idx="0">
+              <a:schemeClr val="accent1"/>
+            </a:effectRef>
+            <a:fontRef idx="minor">
+              <a:schemeClr val="tx1"/>
+            </a:fontRef>
+          </p:style>
+        </p:cxnSp>
+        <p:cxnSp>
+          <p:nvCxnSpPr>
+            <p:cNvPr id="12" name="Straight Arrow Connector 11">
+              <a:extLst>
+                <a:ext uri="{FF2B5EF4-FFF2-40B4-BE49-F238E27FC236}">
+                  <a16:creationId xmlns:a16="http://schemas.microsoft.com/office/drawing/2014/main" id="{179C9231-3BBD-CF46-BCD0-395C833E6A20}"/>
+                </a:ext>
+              </a:extLst>
+            </p:cNvPr>
+            <p:cNvCxnSpPr>
+              <a:stCxn id="55" idx="2"/>
+              <a:endCxn id="9" idx="0"/>
+            </p:cNvCxnSpPr>
+            <p:nvPr/>
+          </p:nvCxnSpPr>
+          <p:spPr>
+            <a:xfrm>
+              <a:off x="6093165" y="2444569"/>
+              <a:ext cx="2835" cy="238996"/>
+            </a:xfrm>
+            <a:prstGeom prst="straightConnector1">
+              <a:avLst/>
+            </a:prstGeom>
+            <a:ln>
+              <a:solidFill>
+                <a:schemeClr val="tx1"/>
+              </a:solidFill>
+              <a:headEnd type="none"/>
+              <a:tailEnd type="arrow"/>
+            </a:ln>
+          </p:spPr>
+          <p:style>
+            <a:lnRef idx="1">
+              <a:schemeClr val="accent1"/>
+            </a:lnRef>
+            <a:fillRef idx="0">
+              <a:schemeClr val="accent1"/>
+            </a:fillRef>
+            <a:effectRef idx="0">
+              <a:schemeClr val="accent1"/>
+            </a:effectRef>
+            <a:fontRef idx="minor">
+              <a:schemeClr val="tx1"/>
+            </a:fontRef>
+          </p:style>
+        </p:cxnSp>
+        <p:sp>
+          <p:nvSpPr>
+            <p:cNvPr id="13" name="TextBox 12">
+              <a:extLst>
+                <a:ext uri="{FF2B5EF4-FFF2-40B4-BE49-F238E27FC236}">
+                  <a16:creationId xmlns:a16="http://schemas.microsoft.com/office/drawing/2014/main" id="{59950511-41A9-E14D-801B-78B467A17C4A}"/>
+                </a:ext>
+              </a:extLst>
+            </p:cNvPr>
+            <p:cNvSpPr txBox="1"/>
+            <p:nvPr/>
+          </p:nvSpPr>
+          <p:spPr>
+            <a:xfrm>
+              <a:off x="3821723" y="1981200"/>
+              <a:ext cx="978153" cy="461665"/>
+            </a:xfrm>
+            <a:prstGeom prst="rect">
+              <a:avLst/>
+            </a:prstGeom>
+            <a:noFill/>
+          </p:spPr>
+          <p:txBody>
+            <a:bodyPr wrap="none" rtlCol="0">
+              <a:spAutoFit/>
+            </a:bodyPr>
+            <a:lstStyle/>
+            <a:p>
+              <a:pPr algn="ctr"/>
+              <a:r>
+                <a:rPr lang="en-US" sz="1200" dirty="0"/>
+                <a:t>LogStream </a:t>
+              </a:r>
+            </a:p>
+            <a:p>
+              <a:pPr algn="ctr"/>
+              <a:r>
+                <a:rPr lang="en-US" sz="1200" dirty="0"/>
+                <a:t>Users</a:t>
+              </a:r>
+            </a:p>
+          </p:txBody>
+        </p:sp>
+      </p:grpSp>
     </p:spTree>
     <p:extLst>
       <p:ext uri="{BB962C8B-B14F-4D97-AF65-F5344CB8AC3E}">
@@ -13618,7 +17287,7 @@
 </p:sld>
 </file>
 
-<file path=ppt/slides/slide4.xml><?xml version="1.0" encoding="utf-8"?>
+<file path=ppt/slides/slide5.xml><?xml version="1.0" encoding="utf-8"?>
 <p:sld xmlns:a="http://schemas.openxmlformats.org/drawingml/2006/main" xmlns:r="http://schemas.openxmlformats.org/officeDocument/2006/relationships" xmlns:p="http://schemas.openxmlformats.org/presentationml/2006/main">
   <p:cSld>
     <p:spTree>

</xml_diff>

<commit_message>
updated image and tested 320
</commit_message>
<xml_diff>
--- a/docs/images/Cribl_AWS.pptx
+++ b/docs/images/Cribl_AWS.pptx
@@ -16583,18 +16583,18 @@
           <p:cNvCxnSpPr>
             <a:cxnSpLocks/>
             <a:stCxn id="34" idx="1"/>
-            <a:endCxn id="9" idx="1"/>
+            <a:endCxn id="61" idx="1"/>
           </p:cNvCxnSpPr>
           <p:nvPr/>
         </p:nvCxnSpPr>
         <p:spPr>
           <a:xfrm rot="10800000" flipH="1">
-            <a:off x="1270006" y="3448866"/>
-            <a:ext cx="3778244" cy="1587592"/>
+            <a:off x="1270006" y="3451158"/>
+            <a:ext cx="2129770" cy="1585301"/>
           </a:xfrm>
           <a:prstGeom prst="bentConnector3">
             <a:avLst>
-              <a:gd name="adj1" fmla="val -6050"/>
+              <a:gd name="adj1" fmla="val -10734"/>
             </a:avLst>
           </a:prstGeom>
           <a:ln>
@@ -17274,6 +17274,305 @@
           </p:txBody>
         </p:sp>
       </p:grpSp>
+      <p:grpSp>
+        <p:nvGrpSpPr>
+          <p:cNvPr id="4" name="Group 3">
+            <a:extLst>
+              <a:ext uri="{FF2B5EF4-FFF2-40B4-BE49-F238E27FC236}">
+                <a16:creationId xmlns:a16="http://schemas.microsoft.com/office/drawing/2014/main" id="{58D25AD3-D34E-7A44-98A5-0149F4EE3276}"/>
+              </a:ext>
+            </a:extLst>
+          </p:cNvPr>
+          <p:cNvGrpSpPr/>
+          <p:nvPr/>
+        </p:nvGrpSpPr>
+        <p:grpSpPr>
+          <a:xfrm>
+            <a:off x="2962454" y="3222557"/>
+            <a:ext cx="1339850" cy="902375"/>
+            <a:chOff x="8250071" y="2805113"/>
+            <a:chExt cx="1339850" cy="902375"/>
+          </a:xfrm>
+        </p:grpSpPr>
+        <p:sp>
+          <p:nvSpPr>
+            <p:cNvPr id="54" name="TextBox 22">
+              <a:extLst>
+                <a:ext uri="{FF2B5EF4-FFF2-40B4-BE49-F238E27FC236}">
+                  <a16:creationId xmlns:a16="http://schemas.microsoft.com/office/drawing/2014/main" id="{3D0B281E-6E66-CB45-B17B-E0485D08B614}"/>
+                </a:ext>
+              </a:extLst>
+            </p:cNvPr>
+            <p:cNvSpPr txBox="1">
+              <a:spLocks noChangeArrowheads="1"/>
+            </p:cNvSpPr>
+            <p:nvPr/>
+          </p:nvSpPr>
+          <p:spPr bwMode="auto">
+            <a:xfrm>
+              <a:off x="8250071" y="3276601"/>
+              <a:ext cx="1339850" cy="430887"/>
+            </a:xfrm>
+            <a:prstGeom prst="rect">
+              <a:avLst/>
+            </a:prstGeom>
+            <a:noFill/>
+            <a:ln>
+              <a:noFill/>
+            </a:ln>
+            <a:extLst>
+              <a:ext uri="{909E8E84-426E-40DD-AFC4-6F175D3DCCD1}">
+                <a14:hiddenFill xmlns:a14="http://schemas.microsoft.com/office/drawing/2010/main">
+                  <a:solidFill>
+                    <a:srgbClr val="FFFFFF"/>
+                  </a:solidFill>
+                </a14:hiddenFill>
+              </a:ext>
+              <a:ext uri="{91240B29-F687-4F45-9708-019B960494DF}">
+                <a14:hiddenLine xmlns:a14="http://schemas.microsoft.com/office/drawing/2010/main" w="9525">
+                  <a:solidFill>
+                    <a:srgbClr val="000000"/>
+                  </a:solidFill>
+                  <a:miter lim="800000"/>
+                  <a:headEnd/>
+                  <a:tailEnd/>
+                </a14:hiddenLine>
+              </a:ext>
+            </a:extLst>
+          </p:spPr>
+          <p:txBody>
+            <a:bodyPr wrap="square">
+              <a:spAutoFit/>
+            </a:bodyPr>
+            <a:lstStyle>
+              <a:lvl1pPr>
+                <a:defRPr>
+                  <a:solidFill>
+                    <a:schemeClr val="tx1"/>
+                  </a:solidFill>
+                  <a:latin typeface="Calibri" panose="020F0502020204030204" pitchFamily="34" charset="0"/>
+                </a:defRPr>
+              </a:lvl1pPr>
+              <a:lvl2pPr marL="742950" indent="-285750">
+                <a:defRPr>
+                  <a:solidFill>
+                    <a:schemeClr val="tx1"/>
+                  </a:solidFill>
+                  <a:latin typeface="Calibri" panose="020F0502020204030204" pitchFamily="34" charset="0"/>
+                </a:defRPr>
+              </a:lvl2pPr>
+              <a:lvl3pPr marL="1143000" indent="-228600">
+                <a:defRPr>
+                  <a:solidFill>
+                    <a:schemeClr val="tx1"/>
+                  </a:solidFill>
+                  <a:latin typeface="Calibri" panose="020F0502020204030204" pitchFamily="34" charset="0"/>
+                </a:defRPr>
+              </a:lvl3pPr>
+              <a:lvl4pPr marL="1600200" indent="-228600">
+                <a:defRPr>
+                  <a:solidFill>
+                    <a:schemeClr val="tx1"/>
+                  </a:solidFill>
+                  <a:latin typeface="Calibri" panose="020F0502020204030204" pitchFamily="34" charset="0"/>
+                </a:defRPr>
+              </a:lvl4pPr>
+              <a:lvl5pPr marL="2057400" indent="-228600">
+                <a:defRPr>
+                  <a:solidFill>
+                    <a:schemeClr val="tx1"/>
+                  </a:solidFill>
+                  <a:latin typeface="Calibri" panose="020F0502020204030204" pitchFamily="34" charset="0"/>
+                </a:defRPr>
+              </a:lvl5pPr>
+              <a:lvl6pPr marL="2514600" indent="-228600" eaLnBrk="0" fontAlgn="base" hangingPunct="0">
+                <a:spcBef>
+                  <a:spcPct val="0"/>
+                </a:spcBef>
+                <a:spcAft>
+                  <a:spcPct val="0"/>
+                </a:spcAft>
+                <a:defRPr>
+                  <a:solidFill>
+                    <a:schemeClr val="tx1"/>
+                  </a:solidFill>
+                  <a:latin typeface="Calibri" panose="020F0502020204030204" pitchFamily="34" charset="0"/>
+                </a:defRPr>
+              </a:lvl6pPr>
+              <a:lvl7pPr marL="2971800" indent="-228600" eaLnBrk="0" fontAlgn="base" hangingPunct="0">
+                <a:spcBef>
+                  <a:spcPct val="0"/>
+                </a:spcBef>
+                <a:spcAft>
+                  <a:spcPct val="0"/>
+                </a:spcAft>
+                <a:defRPr>
+                  <a:solidFill>
+                    <a:schemeClr val="tx1"/>
+                  </a:solidFill>
+                  <a:latin typeface="Calibri" panose="020F0502020204030204" pitchFamily="34" charset="0"/>
+                </a:defRPr>
+              </a:lvl7pPr>
+              <a:lvl8pPr marL="3429000" indent="-228600" eaLnBrk="0" fontAlgn="base" hangingPunct="0">
+                <a:spcBef>
+                  <a:spcPct val="0"/>
+                </a:spcBef>
+                <a:spcAft>
+                  <a:spcPct val="0"/>
+                </a:spcAft>
+                <a:defRPr>
+                  <a:solidFill>
+                    <a:schemeClr val="tx1"/>
+                  </a:solidFill>
+                  <a:latin typeface="Calibri" panose="020F0502020204030204" pitchFamily="34" charset="0"/>
+                </a:defRPr>
+              </a:lvl8pPr>
+              <a:lvl9pPr marL="3886200" indent="-228600" eaLnBrk="0" fontAlgn="base" hangingPunct="0">
+                <a:spcBef>
+                  <a:spcPct val="0"/>
+                </a:spcBef>
+                <a:spcAft>
+                  <a:spcPct val="0"/>
+                </a:spcAft>
+                <a:defRPr>
+                  <a:solidFill>
+                    <a:schemeClr val="tx1"/>
+                  </a:solidFill>
+                  <a:latin typeface="Calibri" panose="020F0502020204030204" pitchFamily="34" charset="0"/>
+                </a:defRPr>
+              </a:lvl9pPr>
+            </a:lstStyle>
+            <a:p>
+              <a:pPr algn="ctr" eaLnBrk="1" hangingPunct="1"/>
+              <a:r>
+                <a:rPr lang="en-US" altLang="en-US" sz="1100" dirty="0">
+                  <a:latin typeface="Arial" panose="020B0604020202020204" pitchFamily="34" charset="0"/>
+                  <a:ea typeface="Amazon Ember" panose="020B0603020204020204" pitchFamily="34" charset="0"/>
+                  <a:cs typeface="Arial" panose="020B0604020202020204" pitchFamily="34" charset="0"/>
+                </a:rPr>
+                <a:t>Network Load </a:t>
+              </a:r>
+              <a:br>
+                <a:rPr lang="en-US" altLang="en-US" sz="1100" dirty="0">
+                  <a:latin typeface="Arial" panose="020B0604020202020204" pitchFamily="34" charset="0"/>
+                  <a:ea typeface="Amazon Ember" panose="020B0603020204020204" pitchFamily="34" charset="0"/>
+                  <a:cs typeface="Arial" panose="020B0604020202020204" pitchFamily="34" charset="0"/>
+                </a:rPr>
+              </a:br>
+              <a:r>
+                <a:rPr lang="en-US" altLang="en-US" sz="1100" dirty="0">
+                  <a:latin typeface="Arial" panose="020B0604020202020204" pitchFamily="34" charset="0"/>
+                  <a:ea typeface="Amazon Ember" panose="020B0603020204020204" pitchFamily="34" charset="0"/>
+                  <a:cs typeface="Arial" panose="020B0604020202020204" pitchFamily="34" charset="0"/>
+                </a:rPr>
+                <a:t>Balancer</a:t>
+              </a:r>
+            </a:p>
+          </p:txBody>
+        </p:sp>
+        <p:pic>
+          <p:nvPicPr>
+            <p:cNvPr id="61" name="Graphic 24">
+              <a:extLst>
+                <a:ext uri="{FF2B5EF4-FFF2-40B4-BE49-F238E27FC236}">
+                  <a16:creationId xmlns:a16="http://schemas.microsoft.com/office/drawing/2014/main" id="{10F380E4-9FC5-B44A-A5A1-F0B8C07F3311}"/>
+                </a:ext>
+              </a:extLst>
+            </p:cNvPr>
+            <p:cNvPicPr>
+              <a:picLocks noChangeAspect="1" noChangeArrowheads="1"/>
+            </p:cNvPicPr>
+            <p:nvPr/>
+          </p:nvPicPr>
+          <p:blipFill>
+            <a:blip r:embed="rId15">
+              <a:extLst>
+                <a:ext uri="{28A0092B-C50C-407E-A947-70E740481C1C}">
+                  <a14:useLocalDpi xmlns:a14="http://schemas.microsoft.com/office/drawing/2010/main" val="0"/>
+                </a:ext>
+              </a:extLst>
+            </a:blip>
+            <a:srcRect/>
+            <a:stretch>
+              <a:fillRect/>
+            </a:stretch>
+          </p:blipFill>
+          <p:spPr bwMode="auto">
+            <a:xfrm>
+              <a:off x="8687393" y="2805113"/>
+              <a:ext cx="457200" cy="457200"/>
+            </a:xfrm>
+            <a:prstGeom prst="rect">
+              <a:avLst/>
+            </a:prstGeom>
+            <a:noFill/>
+            <a:ln>
+              <a:noFill/>
+            </a:ln>
+            <a:extLst>
+              <a:ext uri="{909E8E84-426E-40DD-AFC4-6F175D3DCCD1}">
+                <a14:hiddenFill xmlns:a14="http://schemas.microsoft.com/office/drawing/2010/main">
+                  <a:solidFill>
+                    <a:srgbClr val="FFFFFF"/>
+                  </a:solidFill>
+                </a14:hiddenFill>
+              </a:ext>
+              <a:ext uri="{91240B29-F687-4F45-9708-019B960494DF}">
+                <a14:hiddenLine xmlns:a14="http://schemas.microsoft.com/office/drawing/2010/main" w="9525">
+                  <a:solidFill>
+                    <a:srgbClr val="000000"/>
+                  </a:solidFill>
+                  <a:miter lim="800000"/>
+                  <a:headEnd/>
+                  <a:tailEnd/>
+                </a14:hiddenLine>
+              </a:ext>
+            </a:extLst>
+          </p:spPr>
+        </p:pic>
+      </p:grpSp>
+      <p:cxnSp>
+        <p:nvCxnSpPr>
+          <p:cNvPr id="17" name="Straight Arrow Connector 16">
+            <a:extLst>
+              <a:ext uri="{FF2B5EF4-FFF2-40B4-BE49-F238E27FC236}">
+                <a16:creationId xmlns:a16="http://schemas.microsoft.com/office/drawing/2014/main" id="{FAA495DF-5E4F-9F47-BBF8-195CD3A36E4C}"/>
+              </a:ext>
+            </a:extLst>
+          </p:cNvPr>
+          <p:cNvCxnSpPr>
+            <a:stCxn id="61" idx="3"/>
+            <a:endCxn id="9" idx="1"/>
+          </p:cNvCxnSpPr>
+          <p:nvPr/>
+        </p:nvCxnSpPr>
+        <p:spPr>
+          <a:xfrm flipV="1">
+            <a:off x="3856976" y="3448866"/>
+            <a:ext cx="1191274" cy="2291"/>
+          </a:xfrm>
+          <a:prstGeom prst="straightConnector1">
+            <a:avLst/>
+          </a:prstGeom>
+          <a:ln>
+            <a:tailEnd type="arrow"/>
+          </a:ln>
+        </p:spPr>
+        <p:style>
+          <a:lnRef idx="1">
+            <a:schemeClr val="dk1"/>
+          </a:lnRef>
+          <a:fillRef idx="0">
+            <a:schemeClr val="dk1"/>
+          </a:fillRef>
+          <a:effectRef idx="0">
+            <a:schemeClr val="dk1"/>
+          </a:effectRef>
+          <a:fontRef idx="minor">
+            <a:schemeClr val="tx1"/>
+          </a:fontRef>
+        </p:style>
+      </p:cxnSp>
     </p:spTree>
     <p:extLst>
       <p:ext uri="{BB962C8B-B14F-4D97-AF65-F5344CB8AC3E}">

</xml_diff>